<commit_message>
Mise à jour de la doc
</commit_message>
<xml_diff>
--- a/doc/presentation/presentation.pptx
+++ b/doc/presentation/presentation.pptx
@@ -4,22 +4,26 @@
   <p:sldMasterIdLst>
     <p:sldMasterId id="2147483648" r:id="rId2"/>
   </p:sldMasterIdLst>
+  <p:notesMasterIdLst>
+    <p:notesMasterId r:id="rId16"/>
+  </p:notesMasterIdLst>
   <p:handoutMasterIdLst>
-    <p:handoutMasterId r:id="rId15"/>
+    <p:handoutMasterId r:id="rId17"/>
   </p:handoutMasterIdLst>
   <p:sldIdLst>
     <p:sldId id="256" r:id="rId3"/>
-    <p:sldId id="267" r:id="rId4"/>
-    <p:sldId id="259" r:id="rId5"/>
-    <p:sldId id="257" r:id="rId6"/>
-    <p:sldId id="269" r:id="rId7"/>
-    <p:sldId id="262" r:id="rId8"/>
-    <p:sldId id="263" r:id="rId9"/>
-    <p:sldId id="264" r:id="rId10"/>
-    <p:sldId id="265" r:id="rId11"/>
-    <p:sldId id="266" r:id="rId12"/>
-    <p:sldId id="258" r:id="rId13"/>
-    <p:sldId id="261" r:id="rId14"/>
+    <p:sldId id="273" r:id="rId4"/>
+    <p:sldId id="267" r:id="rId5"/>
+    <p:sldId id="259" r:id="rId6"/>
+    <p:sldId id="257" r:id="rId7"/>
+    <p:sldId id="270" r:id="rId8"/>
+    <p:sldId id="262" r:id="rId9"/>
+    <p:sldId id="279" r:id="rId10"/>
+    <p:sldId id="271" r:id="rId11"/>
+    <p:sldId id="274" r:id="rId12"/>
+    <p:sldId id="275" r:id="rId13"/>
+    <p:sldId id="276" r:id="rId14"/>
+    <p:sldId id="258" r:id="rId15"/>
   </p:sldIdLst>
   <p:sldSz cx="9144000" cy="5143500" type="screen16x9"/>
   <p:notesSz cx="6858000" cy="9144000"/>
@@ -218,7 +222,7 @@
           </a:lstStyle>
           <a:p>
             <a:fld id="{4B230A23-3E98-F64D-859B-DE462771A158}" type="datetimeFigureOut">
-              <a:t>18/06/2015</a:t>
+              <a:t>19/06/2015</a:t>
             </a:fld>
             <a:endParaRPr lang="fr-FR"/>
           </a:p>
@@ -298,6 +302,1412 @@
   </p:cSld>
   <p:clrMap bg1="lt1" tx1="dk1" bg2="lt2" tx2="dk2" accent1="accent1" accent2="accent2" accent3="accent3" accent4="accent4" accent5="accent5" accent6="accent6" hlink="hlink" folHlink="folHlink"/>
 </p:handoutMaster>
+</file>
+
+<file path=ppt/notesMasters/notesMaster1.xml><?xml version="1.0" encoding="utf-8"?>
+<p:notesMaster xmlns:a="http://schemas.openxmlformats.org/drawingml/2006/main" xmlns:r="http://schemas.openxmlformats.org/officeDocument/2006/relationships" xmlns:p="http://schemas.openxmlformats.org/presentationml/2006/main">
+  <p:cSld>
+    <p:bg>
+      <p:bgRef idx="1001">
+        <a:schemeClr val="bg1"/>
+      </p:bgRef>
+    </p:bg>
+    <p:spTree>
+      <p:nvGrpSpPr>
+        <p:cNvPr id="1" name=""/>
+        <p:cNvGrpSpPr/>
+        <p:nvPr/>
+      </p:nvGrpSpPr>
+      <p:grpSpPr>
+        <a:xfrm>
+          <a:off x="0" y="0"/>
+          <a:ext cx="0" cy="0"/>
+          <a:chOff x="0" y="0"/>
+          <a:chExt cx="0" cy="0"/>
+        </a:xfrm>
+      </p:grpSpPr>
+      <p:sp>
+        <p:nvSpPr>
+          <p:cNvPr id="2" name="Espace réservé de l'en-tête 1"/>
+          <p:cNvSpPr>
+            <a:spLocks noGrp="1"/>
+          </p:cNvSpPr>
+          <p:nvPr>
+            <p:ph type="hdr" sz="quarter"/>
+          </p:nvPr>
+        </p:nvSpPr>
+        <p:spPr>
+          <a:xfrm>
+            <a:off x="0" y="0"/>
+            <a:ext cx="2971800" cy="458788"/>
+          </a:xfrm>
+          <a:prstGeom prst="rect">
+            <a:avLst/>
+          </a:prstGeom>
+        </p:spPr>
+        <p:txBody>
+          <a:bodyPr vert="horz" lIns="91440" tIns="45720" rIns="91440" bIns="45720" rtlCol="0"/>
+          <a:lstStyle>
+            <a:lvl1pPr algn="l">
+              <a:defRPr sz="1200"/>
+            </a:lvl1pPr>
+          </a:lstStyle>
+          <a:p>
+            <a:endParaRPr lang="fr-CH"/>
+          </a:p>
+        </p:txBody>
+      </p:sp>
+      <p:sp>
+        <p:nvSpPr>
+          <p:cNvPr id="3" name="Espace réservé de la date 2"/>
+          <p:cNvSpPr>
+            <a:spLocks noGrp="1"/>
+          </p:cNvSpPr>
+          <p:nvPr>
+            <p:ph type="dt" idx="1"/>
+          </p:nvPr>
+        </p:nvSpPr>
+        <p:spPr>
+          <a:xfrm>
+            <a:off x="3884613" y="0"/>
+            <a:ext cx="2971800" cy="458788"/>
+          </a:xfrm>
+          <a:prstGeom prst="rect">
+            <a:avLst/>
+          </a:prstGeom>
+        </p:spPr>
+        <p:txBody>
+          <a:bodyPr vert="horz" lIns="91440" tIns="45720" rIns="91440" bIns="45720" rtlCol="0"/>
+          <a:lstStyle>
+            <a:lvl1pPr algn="r">
+              <a:defRPr sz="1200"/>
+            </a:lvl1pPr>
+          </a:lstStyle>
+          <a:p>
+            <a:fld id="{6368B92D-E4AB-40E1-A2E6-E7AD2927FBD1}" type="datetimeFigureOut">
+              <a:rPr lang="fr-CH" smtClean="0"/>
+              <a:t>19.06.2015</a:t>
+            </a:fld>
+            <a:endParaRPr lang="fr-CH"/>
+          </a:p>
+        </p:txBody>
+      </p:sp>
+      <p:sp>
+        <p:nvSpPr>
+          <p:cNvPr id="4" name="Espace réservé de l'image des diapositives 3"/>
+          <p:cNvSpPr>
+            <a:spLocks noGrp="1" noRot="1" noChangeAspect="1"/>
+          </p:cNvSpPr>
+          <p:nvPr>
+            <p:ph type="sldImg" idx="2"/>
+          </p:nvPr>
+        </p:nvSpPr>
+        <p:spPr>
+          <a:xfrm>
+            <a:off x="685800" y="1143000"/>
+            <a:ext cx="5486400" cy="3086100"/>
+          </a:xfrm>
+          <a:prstGeom prst="rect">
+            <a:avLst/>
+          </a:prstGeom>
+          <a:noFill/>
+          <a:ln w="12700">
+            <a:solidFill>
+              <a:prstClr val="black"/>
+            </a:solidFill>
+          </a:ln>
+        </p:spPr>
+        <p:txBody>
+          <a:bodyPr vert="horz" lIns="91440" tIns="45720" rIns="91440" bIns="45720" rtlCol="0" anchor="ctr"/>
+          <a:lstStyle/>
+          <a:p>
+            <a:endParaRPr lang="fr-CH"/>
+          </a:p>
+        </p:txBody>
+      </p:sp>
+      <p:sp>
+        <p:nvSpPr>
+          <p:cNvPr id="5" name="Espace réservé des commentaires 4"/>
+          <p:cNvSpPr>
+            <a:spLocks noGrp="1"/>
+          </p:cNvSpPr>
+          <p:nvPr>
+            <p:ph type="body" sz="quarter" idx="3"/>
+          </p:nvPr>
+        </p:nvSpPr>
+        <p:spPr>
+          <a:xfrm>
+            <a:off x="685800" y="4400550"/>
+            <a:ext cx="5486400" cy="3600450"/>
+          </a:xfrm>
+          <a:prstGeom prst="rect">
+            <a:avLst/>
+          </a:prstGeom>
+        </p:spPr>
+        <p:txBody>
+          <a:bodyPr vert="horz" lIns="91440" tIns="45720" rIns="91440" bIns="45720" rtlCol="0"/>
+          <a:lstStyle/>
+          <a:p>
+            <a:pPr lvl="0"/>
+            <a:r>
+              <a:rPr lang="fr-FR" smtClean="0"/>
+              <a:t>Modifiez les styles du texte du masque</a:t>
+            </a:r>
+          </a:p>
+          <a:p>
+            <a:pPr lvl="1"/>
+            <a:r>
+              <a:rPr lang="fr-FR" smtClean="0"/>
+              <a:t>Deuxième niveau</a:t>
+            </a:r>
+          </a:p>
+          <a:p>
+            <a:pPr lvl="2"/>
+            <a:r>
+              <a:rPr lang="fr-FR" smtClean="0"/>
+              <a:t>Troisième niveau</a:t>
+            </a:r>
+          </a:p>
+          <a:p>
+            <a:pPr lvl="3"/>
+            <a:r>
+              <a:rPr lang="fr-FR" smtClean="0"/>
+              <a:t>Quatrième niveau</a:t>
+            </a:r>
+          </a:p>
+          <a:p>
+            <a:pPr lvl="4"/>
+            <a:r>
+              <a:rPr lang="fr-FR" smtClean="0"/>
+              <a:t>Cinquième niveau</a:t>
+            </a:r>
+            <a:endParaRPr lang="fr-CH"/>
+          </a:p>
+        </p:txBody>
+      </p:sp>
+      <p:sp>
+        <p:nvSpPr>
+          <p:cNvPr id="6" name="Espace réservé du pied de page 5"/>
+          <p:cNvSpPr>
+            <a:spLocks noGrp="1"/>
+          </p:cNvSpPr>
+          <p:nvPr>
+            <p:ph type="ftr" sz="quarter" idx="4"/>
+          </p:nvPr>
+        </p:nvSpPr>
+        <p:spPr>
+          <a:xfrm>
+            <a:off x="0" y="8685213"/>
+            <a:ext cx="2971800" cy="458787"/>
+          </a:xfrm>
+          <a:prstGeom prst="rect">
+            <a:avLst/>
+          </a:prstGeom>
+        </p:spPr>
+        <p:txBody>
+          <a:bodyPr vert="horz" lIns="91440" tIns="45720" rIns="91440" bIns="45720" rtlCol="0" anchor="b"/>
+          <a:lstStyle>
+            <a:lvl1pPr algn="l">
+              <a:defRPr sz="1200"/>
+            </a:lvl1pPr>
+          </a:lstStyle>
+          <a:p>
+            <a:endParaRPr lang="fr-CH"/>
+          </a:p>
+        </p:txBody>
+      </p:sp>
+      <p:sp>
+        <p:nvSpPr>
+          <p:cNvPr id="7" name="Espace réservé du numéro de diapositive 6"/>
+          <p:cNvSpPr>
+            <a:spLocks noGrp="1"/>
+          </p:cNvSpPr>
+          <p:nvPr>
+            <p:ph type="sldNum" sz="quarter" idx="5"/>
+          </p:nvPr>
+        </p:nvSpPr>
+        <p:spPr>
+          <a:xfrm>
+            <a:off x="3884613" y="8685213"/>
+            <a:ext cx="2971800" cy="458787"/>
+          </a:xfrm>
+          <a:prstGeom prst="rect">
+            <a:avLst/>
+          </a:prstGeom>
+        </p:spPr>
+        <p:txBody>
+          <a:bodyPr vert="horz" lIns="91440" tIns="45720" rIns="91440" bIns="45720" rtlCol="0" anchor="b"/>
+          <a:lstStyle>
+            <a:lvl1pPr algn="r">
+              <a:defRPr sz="1200"/>
+            </a:lvl1pPr>
+          </a:lstStyle>
+          <a:p>
+            <a:fld id="{9CEEF3C3-BA39-4E5D-9C35-E64B6F5C9CA2}" type="slidenum">
+              <a:rPr lang="fr-CH" smtClean="0"/>
+              <a:t>‹N°›</a:t>
+            </a:fld>
+            <a:endParaRPr lang="fr-CH"/>
+          </a:p>
+        </p:txBody>
+      </p:sp>
+    </p:spTree>
+    <p:extLst>
+      <p:ext uri="{BB962C8B-B14F-4D97-AF65-F5344CB8AC3E}">
+        <p14:creationId xmlns:p14="http://schemas.microsoft.com/office/powerpoint/2010/main" val="3760750441"/>
+      </p:ext>
+    </p:extLst>
+  </p:cSld>
+  <p:clrMap bg1="lt1" tx1="dk1" bg2="lt2" tx2="dk2" accent1="accent1" accent2="accent2" accent3="accent3" accent4="accent4" accent5="accent5" accent6="accent6" hlink="hlink" folHlink="folHlink"/>
+  <p:notesStyle>
+    <a:lvl1pPr marL="0" algn="l" defTabSz="914400" rtl="0" eaLnBrk="1" latinLnBrk="0" hangingPunct="1">
+      <a:defRPr sz="1200" kern="1200">
+        <a:solidFill>
+          <a:schemeClr val="tx1"/>
+        </a:solidFill>
+        <a:latin typeface="+mn-lt"/>
+        <a:ea typeface="+mn-ea"/>
+        <a:cs typeface="+mn-cs"/>
+      </a:defRPr>
+    </a:lvl1pPr>
+    <a:lvl2pPr marL="457200" algn="l" defTabSz="914400" rtl="0" eaLnBrk="1" latinLnBrk="0" hangingPunct="1">
+      <a:defRPr sz="1200" kern="1200">
+        <a:solidFill>
+          <a:schemeClr val="tx1"/>
+        </a:solidFill>
+        <a:latin typeface="+mn-lt"/>
+        <a:ea typeface="+mn-ea"/>
+        <a:cs typeface="+mn-cs"/>
+      </a:defRPr>
+    </a:lvl2pPr>
+    <a:lvl3pPr marL="914400" algn="l" defTabSz="914400" rtl="0" eaLnBrk="1" latinLnBrk="0" hangingPunct="1">
+      <a:defRPr sz="1200" kern="1200">
+        <a:solidFill>
+          <a:schemeClr val="tx1"/>
+        </a:solidFill>
+        <a:latin typeface="+mn-lt"/>
+        <a:ea typeface="+mn-ea"/>
+        <a:cs typeface="+mn-cs"/>
+      </a:defRPr>
+    </a:lvl3pPr>
+    <a:lvl4pPr marL="1371600" algn="l" defTabSz="914400" rtl="0" eaLnBrk="1" latinLnBrk="0" hangingPunct="1">
+      <a:defRPr sz="1200" kern="1200">
+        <a:solidFill>
+          <a:schemeClr val="tx1"/>
+        </a:solidFill>
+        <a:latin typeface="+mn-lt"/>
+        <a:ea typeface="+mn-ea"/>
+        <a:cs typeface="+mn-cs"/>
+      </a:defRPr>
+    </a:lvl4pPr>
+    <a:lvl5pPr marL="1828800" algn="l" defTabSz="914400" rtl="0" eaLnBrk="1" latinLnBrk="0" hangingPunct="1">
+      <a:defRPr sz="1200" kern="1200">
+        <a:solidFill>
+          <a:schemeClr val="tx1"/>
+        </a:solidFill>
+        <a:latin typeface="+mn-lt"/>
+        <a:ea typeface="+mn-ea"/>
+        <a:cs typeface="+mn-cs"/>
+      </a:defRPr>
+    </a:lvl5pPr>
+    <a:lvl6pPr marL="2286000" algn="l" defTabSz="914400" rtl="0" eaLnBrk="1" latinLnBrk="0" hangingPunct="1">
+      <a:defRPr sz="1200" kern="1200">
+        <a:solidFill>
+          <a:schemeClr val="tx1"/>
+        </a:solidFill>
+        <a:latin typeface="+mn-lt"/>
+        <a:ea typeface="+mn-ea"/>
+        <a:cs typeface="+mn-cs"/>
+      </a:defRPr>
+    </a:lvl6pPr>
+    <a:lvl7pPr marL="2743200" algn="l" defTabSz="914400" rtl="0" eaLnBrk="1" latinLnBrk="0" hangingPunct="1">
+      <a:defRPr sz="1200" kern="1200">
+        <a:solidFill>
+          <a:schemeClr val="tx1"/>
+        </a:solidFill>
+        <a:latin typeface="+mn-lt"/>
+        <a:ea typeface="+mn-ea"/>
+        <a:cs typeface="+mn-cs"/>
+      </a:defRPr>
+    </a:lvl7pPr>
+    <a:lvl8pPr marL="3200400" algn="l" defTabSz="914400" rtl="0" eaLnBrk="1" latinLnBrk="0" hangingPunct="1">
+      <a:defRPr sz="1200" kern="1200">
+        <a:solidFill>
+          <a:schemeClr val="tx1"/>
+        </a:solidFill>
+        <a:latin typeface="+mn-lt"/>
+        <a:ea typeface="+mn-ea"/>
+        <a:cs typeface="+mn-cs"/>
+      </a:defRPr>
+    </a:lvl8pPr>
+    <a:lvl9pPr marL="3657600" algn="l" defTabSz="914400" rtl="0" eaLnBrk="1" latinLnBrk="0" hangingPunct="1">
+      <a:defRPr sz="1200" kern="1200">
+        <a:solidFill>
+          <a:schemeClr val="tx1"/>
+        </a:solidFill>
+        <a:latin typeface="+mn-lt"/>
+        <a:ea typeface="+mn-ea"/>
+        <a:cs typeface="+mn-cs"/>
+      </a:defRPr>
+    </a:lvl9pPr>
+  </p:notesStyle>
+</p:notesMaster>
+</file>
+
+<file path=ppt/notesSlides/notesSlide1.xml><?xml version="1.0" encoding="utf-8"?>
+<p:notes xmlns:a="http://schemas.openxmlformats.org/drawingml/2006/main" xmlns:r="http://schemas.openxmlformats.org/officeDocument/2006/relationships" xmlns:p="http://schemas.openxmlformats.org/presentationml/2006/main">
+  <p:cSld>
+    <p:spTree>
+      <p:nvGrpSpPr>
+        <p:cNvPr id="1" name=""/>
+        <p:cNvGrpSpPr/>
+        <p:nvPr/>
+      </p:nvGrpSpPr>
+      <p:grpSpPr>
+        <a:xfrm>
+          <a:off x="0" y="0"/>
+          <a:ext cx="0" cy="0"/>
+          <a:chOff x="0" y="0"/>
+          <a:chExt cx="0" cy="0"/>
+        </a:xfrm>
+      </p:grpSpPr>
+      <p:sp>
+        <p:nvSpPr>
+          <p:cNvPr id="2" name="Espace réservé de l'image des diapositives 1"/>
+          <p:cNvSpPr>
+            <a:spLocks noGrp="1" noRot="1" noChangeAspect="1"/>
+          </p:cNvSpPr>
+          <p:nvPr>
+            <p:ph type="sldImg"/>
+          </p:nvPr>
+        </p:nvSpPr>
+        <p:spPr/>
+      </p:sp>
+      <p:sp>
+        <p:nvSpPr>
+          <p:cNvPr id="3" name="Espace réservé des commentaires 2"/>
+          <p:cNvSpPr>
+            <a:spLocks noGrp="1"/>
+          </p:cNvSpPr>
+          <p:nvPr>
+            <p:ph type="body" idx="1"/>
+          </p:nvPr>
+        </p:nvSpPr>
+        <p:spPr/>
+        <p:txBody>
+          <a:bodyPr/>
+          <a:lstStyle/>
+          <a:p>
+            <a:r>
+              <a:rPr lang="fr-CH" dirty="0" smtClean="0"/>
+              <a:t>Armand</a:t>
+            </a:r>
+            <a:endParaRPr lang="fr-CH" dirty="0"/>
+          </a:p>
+        </p:txBody>
+      </p:sp>
+      <p:sp>
+        <p:nvSpPr>
+          <p:cNvPr id="4" name="Espace réservé du numéro de diapositive 3"/>
+          <p:cNvSpPr>
+            <a:spLocks noGrp="1"/>
+          </p:cNvSpPr>
+          <p:nvPr>
+            <p:ph type="sldNum" sz="quarter" idx="10"/>
+          </p:nvPr>
+        </p:nvSpPr>
+        <p:spPr/>
+        <p:txBody>
+          <a:bodyPr/>
+          <a:lstStyle/>
+          <a:p>
+            <a:fld id="{9CEEF3C3-BA39-4E5D-9C35-E64B6F5C9CA2}" type="slidenum">
+              <a:rPr lang="fr-CH" smtClean="0"/>
+              <a:t>1</a:t>
+            </a:fld>
+            <a:endParaRPr lang="fr-CH"/>
+          </a:p>
+        </p:txBody>
+      </p:sp>
+    </p:spTree>
+    <p:extLst>
+      <p:ext uri="{BB962C8B-B14F-4D97-AF65-F5344CB8AC3E}">
+        <p14:creationId xmlns:p14="http://schemas.microsoft.com/office/powerpoint/2010/main" val="695908181"/>
+      </p:ext>
+    </p:extLst>
+  </p:cSld>
+  <p:clrMapOvr>
+    <a:masterClrMapping/>
+  </p:clrMapOvr>
+</p:notes>
+</file>
+
+<file path=ppt/notesSlides/notesSlide10.xml><?xml version="1.0" encoding="utf-8"?>
+<p:notes xmlns:a="http://schemas.openxmlformats.org/drawingml/2006/main" xmlns:r="http://schemas.openxmlformats.org/officeDocument/2006/relationships" xmlns:p="http://schemas.openxmlformats.org/presentationml/2006/main">
+  <p:cSld>
+    <p:spTree>
+      <p:nvGrpSpPr>
+        <p:cNvPr id="1" name=""/>
+        <p:cNvGrpSpPr/>
+        <p:nvPr/>
+      </p:nvGrpSpPr>
+      <p:grpSpPr>
+        <a:xfrm>
+          <a:off x="0" y="0"/>
+          <a:ext cx="0" cy="0"/>
+          <a:chOff x="0" y="0"/>
+          <a:chExt cx="0" cy="0"/>
+        </a:xfrm>
+      </p:grpSpPr>
+      <p:sp>
+        <p:nvSpPr>
+          <p:cNvPr id="2" name="Espace réservé de l'image des diapositives 1"/>
+          <p:cNvSpPr>
+            <a:spLocks noGrp="1" noRot="1" noChangeAspect="1"/>
+          </p:cNvSpPr>
+          <p:nvPr>
+            <p:ph type="sldImg"/>
+          </p:nvPr>
+        </p:nvSpPr>
+        <p:spPr/>
+      </p:sp>
+      <p:sp>
+        <p:nvSpPr>
+          <p:cNvPr id="3" name="Espace réservé des commentaires 2"/>
+          <p:cNvSpPr>
+            <a:spLocks noGrp="1"/>
+          </p:cNvSpPr>
+          <p:nvPr>
+            <p:ph type="body" idx="1"/>
+          </p:nvPr>
+        </p:nvSpPr>
+        <p:spPr/>
+        <p:txBody>
+          <a:bodyPr/>
+          <a:lstStyle/>
+          <a:p>
+            <a:r>
+              <a:rPr lang="fr-CH" dirty="0" smtClean="0"/>
+              <a:t>Simon</a:t>
+            </a:r>
+            <a:endParaRPr lang="fr-CH" dirty="0"/>
+          </a:p>
+        </p:txBody>
+      </p:sp>
+      <p:sp>
+        <p:nvSpPr>
+          <p:cNvPr id="4" name="Espace réservé du numéro de diapositive 3"/>
+          <p:cNvSpPr>
+            <a:spLocks noGrp="1"/>
+          </p:cNvSpPr>
+          <p:nvPr>
+            <p:ph type="sldNum" sz="quarter" idx="10"/>
+          </p:nvPr>
+        </p:nvSpPr>
+        <p:spPr/>
+        <p:txBody>
+          <a:bodyPr/>
+          <a:lstStyle/>
+          <a:p>
+            <a:fld id="{9CEEF3C3-BA39-4E5D-9C35-E64B6F5C9CA2}" type="slidenum">
+              <a:rPr lang="fr-CH" smtClean="0"/>
+              <a:t>10</a:t>
+            </a:fld>
+            <a:endParaRPr lang="fr-CH"/>
+          </a:p>
+        </p:txBody>
+      </p:sp>
+    </p:spTree>
+    <p:extLst>
+      <p:ext uri="{BB962C8B-B14F-4D97-AF65-F5344CB8AC3E}">
+        <p14:creationId xmlns:p14="http://schemas.microsoft.com/office/powerpoint/2010/main" val="2458902855"/>
+      </p:ext>
+    </p:extLst>
+  </p:cSld>
+  <p:clrMapOvr>
+    <a:masterClrMapping/>
+  </p:clrMapOvr>
+</p:notes>
+</file>
+
+<file path=ppt/notesSlides/notesSlide11.xml><?xml version="1.0" encoding="utf-8"?>
+<p:notes xmlns:a="http://schemas.openxmlformats.org/drawingml/2006/main" xmlns:r="http://schemas.openxmlformats.org/officeDocument/2006/relationships" xmlns:p="http://schemas.openxmlformats.org/presentationml/2006/main">
+  <p:cSld>
+    <p:spTree>
+      <p:nvGrpSpPr>
+        <p:cNvPr id="1" name=""/>
+        <p:cNvGrpSpPr/>
+        <p:nvPr/>
+      </p:nvGrpSpPr>
+      <p:grpSpPr>
+        <a:xfrm>
+          <a:off x="0" y="0"/>
+          <a:ext cx="0" cy="0"/>
+          <a:chOff x="0" y="0"/>
+          <a:chExt cx="0" cy="0"/>
+        </a:xfrm>
+      </p:grpSpPr>
+      <p:sp>
+        <p:nvSpPr>
+          <p:cNvPr id="2" name="Espace réservé de l'image des diapositives 1"/>
+          <p:cNvSpPr>
+            <a:spLocks noGrp="1" noRot="1" noChangeAspect="1"/>
+          </p:cNvSpPr>
+          <p:nvPr>
+            <p:ph type="sldImg"/>
+          </p:nvPr>
+        </p:nvSpPr>
+        <p:spPr/>
+      </p:sp>
+      <p:sp>
+        <p:nvSpPr>
+          <p:cNvPr id="3" name="Espace réservé des commentaires 2"/>
+          <p:cNvSpPr>
+            <a:spLocks noGrp="1"/>
+          </p:cNvSpPr>
+          <p:nvPr>
+            <p:ph type="body" idx="1"/>
+          </p:nvPr>
+        </p:nvSpPr>
+        <p:spPr/>
+        <p:txBody>
+          <a:bodyPr/>
+          <a:lstStyle/>
+          <a:p>
+            <a:r>
+              <a:rPr lang="fr-CH" dirty="0" smtClean="0"/>
+              <a:t>Benoit</a:t>
+            </a:r>
+            <a:endParaRPr lang="fr-CH" dirty="0"/>
+          </a:p>
+        </p:txBody>
+      </p:sp>
+      <p:sp>
+        <p:nvSpPr>
+          <p:cNvPr id="4" name="Espace réservé du numéro de diapositive 3"/>
+          <p:cNvSpPr>
+            <a:spLocks noGrp="1"/>
+          </p:cNvSpPr>
+          <p:nvPr>
+            <p:ph type="sldNum" sz="quarter" idx="10"/>
+          </p:nvPr>
+        </p:nvSpPr>
+        <p:spPr/>
+        <p:txBody>
+          <a:bodyPr/>
+          <a:lstStyle/>
+          <a:p>
+            <a:fld id="{9CEEF3C3-BA39-4E5D-9C35-E64B6F5C9CA2}" type="slidenum">
+              <a:rPr lang="fr-CH" smtClean="0"/>
+              <a:t>11</a:t>
+            </a:fld>
+            <a:endParaRPr lang="fr-CH"/>
+          </a:p>
+        </p:txBody>
+      </p:sp>
+    </p:spTree>
+    <p:extLst>
+      <p:ext uri="{BB962C8B-B14F-4D97-AF65-F5344CB8AC3E}">
+        <p14:creationId xmlns:p14="http://schemas.microsoft.com/office/powerpoint/2010/main" val="2349966191"/>
+      </p:ext>
+    </p:extLst>
+  </p:cSld>
+  <p:clrMapOvr>
+    <a:masterClrMapping/>
+  </p:clrMapOvr>
+</p:notes>
+</file>
+
+<file path=ppt/notesSlides/notesSlide12.xml><?xml version="1.0" encoding="utf-8"?>
+<p:notes xmlns:a="http://schemas.openxmlformats.org/drawingml/2006/main" xmlns:r="http://schemas.openxmlformats.org/officeDocument/2006/relationships" xmlns:p="http://schemas.openxmlformats.org/presentationml/2006/main">
+  <p:cSld>
+    <p:spTree>
+      <p:nvGrpSpPr>
+        <p:cNvPr id="1" name=""/>
+        <p:cNvGrpSpPr/>
+        <p:nvPr/>
+      </p:nvGrpSpPr>
+      <p:grpSpPr>
+        <a:xfrm>
+          <a:off x="0" y="0"/>
+          <a:ext cx="0" cy="0"/>
+          <a:chOff x="0" y="0"/>
+          <a:chExt cx="0" cy="0"/>
+        </a:xfrm>
+      </p:grpSpPr>
+      <p:sp>
+        <p:nvSpPr>
+          <p:cNvPr id="2" name="Espace réservé de l'image des diapositives 1"/>
+          <p:cNvSpPr>
+            <a:spLocks noGrp="1" noRot="1" noChangeAspect="1"/>
+          </p:cNvSpPr>
+          <p:nvPr>
+            <p:ph type="sldImg"/>
+          </p:nvPr>
+        </p:nvSpPr>
+        <p:spPr/>
+      </p:sp>
+      <p:sp>
+        <p:nvSpPr>
+          <p:cNvPr id="3" name="Espace réservé des commentaires 2"/>
+          <p:cNvSpPr>
+            <a:spLocks noGrp="1"/>
+          </p:cNvSpPr>
+          <p:nvPr>
+            <p:ph type="body" idx="1"/>
+          </p:nvPr>
+        </p:nvSpPr>
+        <p:spPr/>
+        <p:txBody>
+          <a:bodyPr/>
+          <a:lstStyle/>
+          <a:p>
+            <a:r>
+              <a:rPr lang="fr-CH" dirty="0" smtClean="0"/>
+              <a:t>Benoit</a:t>
+            </a:r>
+            <a:endParaRPr lang="fr-CH" dirty="0"/>
+          </a:p>
+        </p:txBody>
+      </p:sp>
+      <p:sp>
+        <p:nvSpPr>
+          <p:cNvPr id="4" name="Espace réservé du numéro de diapositive 3"/>
+          <p:cNvSpPr>
+            <a:spLocks noGrp="1"/>
+          </p:cNvSpPr>
+          <p:nvPr>
+            <p:ph type="sldNum" sz="quarter" idx="10"/>
+          </p:nvPr>
+        </p:nvSpPr>
+        <p:spPr/>
+        <p:txBody>
+          <a:bodyPr/>
+          <a:lstStyle/>
+          <a:p>
+            <a:fld id="{9CEEF3C3-BA39-4E5D-9C35-E64B6F5C9CA2}" type="slidenum">
+              <a:rPr lang="fr-CH" smtClean="0"/>
+              <a:t>12</a:t>
+            </a:fld>
+            <a:endParaRPr lang="fr-CH"/>
+          </a:p>
+        </p:txBody>
+      </p:sp>
+    </p:spTree>
+    <p:extLst>
+      <p:ext uri="{BB962C8B-B14F-4D97-AF65-F5344CB8AC3E}">
+        <p14:creationId xmlns:p14="http://schemas.microsoft.com/office/powerpoint/2010/main" val="3939465567"/>
+      </p:ext>
+    </p:extLst>
+  </p:cSld>
+  <p:clrMapOvr>
+    <a:masterClrMapping/>
+  </p:clrMapOvr>
+</p:notes>
+</file>
+
+<file path=ppt/notesSlides/notesSlide2.xml><?xml version="1.0" encoding="utf-8"?>
+<p:notes xmlns:a="http://schemas.openxmlformats.org/drawingml/2006/main" xmlns:r="http://schemas.openxmlformats.org/officeDocument/2006/relationships" xmlns:p="http://schemas.openxmlformats.org/presentationml/2006/main">
+  <p:cSld>
+    <p:spTree>
+      <p:nvGrpSpPr>
+        <p:cNvPr id="1" name=""/>
+        <p:cNvGrpSpPr/>
+        <p:nvPr/>
+      </p:nvGrpSpPr>
+      <p:grpSpPr>
+        <a:xfrm>
+          <a:off x="0" y="0"/>
+          <a:ext cx="0" cy="0"/>
+          <a:chOff x="0" y="0"/>
+          <a:chExt cx="0" cy="0"/>
+        </a:xfrm>
+      </p:grpSpPr>
+      <p:sp>
+        <p:nvSpPr>
+          <p:cNvPr id="2" name="Espace réservé de l'image des diapositives 1"/>
+          <p:cNvSpPr>
+            <a:spLocks noGrp="1" noRot="1" noChangeAspect="1"/>
+          </p:cNvSpPr>
+          <p:nvPr>
+            <p:ph type="sldImg"/>
+          </p:nvPr>
+        </p:nvSpPr>
+        <p:spPr/>
+      </p:sp>
+      <p:sp>
+        <p:nvSpPr>
+          <p:cNvPr id="3" name="Espace réservé des commentaires 2"/>
+          <p:cNvSpPr>
+            <a:spLocks noGrp="1"/>
+          </p:cNvSpPr>
+          <p:nvPr>
+            <p:ph type="body" idx="1"/>
+          </p:nvPr>
+        </p:nvSpPr>
+        <p:spPr/>
+        <p:txBody>
+          <a:bodyPr/>
+          <a:lstStyle/>
+          <a:p>
+            <a:r>
+              <a:rPr lang="fr-CH" dirty="0" smtClean="0"/>
+              <a:t>Armand</a:t>
+            </a:r>
+            <a:endParaRPr lang="fr-CH" dirty="0"/>
+          </a:p>
+        </p:txBody>
+      </p:sp>
+      <p:sp>
+        <p:nvSpPr>
+          <p:cNvPr id="4" name="Espace réservé du numéro de diapositive 3"/>
+          <p:cNvSpPr>
+            <a:spLocks noGrp="1"/>
+          </p:cNvSpPr>
+          <p:nvPr>
+            <p:ph type="sldNum" sz="quarter" idx="10"/>
+          </p:nvPr>
+        </p:nvSpPr>
+        <p:spPr/>
+        <p:txBody>
+          <a:bodyPr/>
+          <a:lstStyle/>
+          <a:p>
+            <a:fld id="{9CEEF3C3-BA39-4E5D-9C35-E64B6F5C9CA2}" type="slidenum">
+              <a:rPr lang="fr-CH" smtClean="0"/>
+              <a:t>2</a:t>
+            </a:fld>
+            <a:endParaRPr lang="fr-CH"/>
+          </a:p>
+        </p:txBody>
+      </p:sp>
+    </p:spTree>
+    <p:extLst>
+      <p:ext uri="{BB962C8B-B14F-4D97-AF65-F5344CB8AC3E}">
+        <p14:creationId xmlns:p14="http://schemas.microsoft.com/office/powerpoint/2010/main" val="1348368001"/>
+      </p:ext>
+    </p:extLst>
+  </p:cSld>
+  <p:clrMapOvr>
+    <a:masterClrMapping/>
+  </p:clrMapOvr>
+</p:notes>
+</file>
+
+<file path=ppt/notesSlides/notesSlide3.xml><?xml version="1.0" encoding="utf-8"?>
+<p:notes xmlns:a="http://schemas.openxmlformats.org/drawingml/2006/main" xmlns:r="http://schemas.openxmlformats.org/officeDocument/2006/relationships" xmlns:p="http://schemas.openxmlformats.org/presentationml/2006/main">
+  <p:cSld>
+    <p:spTree>
+      <p:nvGrpSpPr>
+        <p:cNvPr id="1" name=""/>
+        <p:cNvGrpSpPr/>
+        <p:nvPr/>
+      </p:nvGrpSpPr>
+      <p:grpSpPr>
+        <a:xfrm>
+          <a:off x="0" y="0"/>
+          <a:ext cx="0" cy="0"/>
+          <a:chOff x="0" y="0"/>
+          <a:chExt cx="0" cy="0"/>
+        </a:xfrm>
+      </p:grpSpPr>
+      <p:sp>
+        <p:nvSpPr>
+          <p:cNvPr id="2" name="Espace réservé de l'image des diapositives 1"/>
+          <p:cNvSpPr>
+            <a:spLocks noGrp="1" noRot="1" noChangeAspect="1"/>
+          </p:cNvSpPr>
+          <p:nvPr>
+            <p:ph type="sldImg"/>
+          </p:nvPr>
+        </p:nvSpPr>
+        <p:spPr/>
+      </p:sp>
+      <p:sp>
+        <p:nvSpPr>
+          <p:cNvPr id="3" name="Espace réservé des commentaires 2"/>
+          <p:cNvSpPr>
+            <a:spLocks noGrp="1"/>
+          </p:cNvSpPr>
+          <p:nvPr>
+            <p:ph type="body" idx="1"/>
+          </p:nvPr>
+        </p:nvSpPr>
+        <p:spPr/>
+        <p:txBody>
+          <a:bodyPr/>
+          <a:lstStyle/>
+          <a:p>
+            <a:r>
+              <a:rPr lang="fr-CH" dirty="0" smtClean="0"/>
+              <a:t>Armand</a:t>
+            </a:r>
+            <a:endParaRPr lang="fr-CH" dirty="0"/>
+          </a:p>
+        </p:txBody>
+      </p:sp>
+      <p:sp>
+        <p:nvSpPr>
+          <p:cNvPr id="4" name="Espace réservé du numéro de diapositive 3"/>
+          <p:cNvSpPr>
+            <a:spLocks noGrp="1"/>
+          </p:cNvSpPr>
+          <p:nvPr>
+            <p:ph type="sldNum" sz="quarter" idx="10"/>
+          </p:nvPr>
+        </p:nvSpPr>
+        <p:spPr/>
+        <p:txBody>
+          <a:bodyPr/>
+          <a:lstStyle/>
+          <a:p>
+            <a:fld id="{9CEEF3C3-BA39-4E5D-9C35-E64B6F5C9CA2}" type="slidenum">
+              <a:rPr lang="fr-CH" smtClean="0"/>
+              <a:t>3</a:t>
+            </a:fld>
+            <a:endParaRPr lang="fr-CH"/>
+          </a:p>
+        </p:txBody>
+      </p:sp>
+    </p:spTree>
+    <p:extLst>
+      <p:ext uri="{BB962C8B-B14F-4D97-AF65-F5344CB8AC3E}">
+        <p14:creationId xmlns:p14="http://schemas.microsoft.com/office/powerpoint/2010/main" val="4243296629"/>
+      </p:ext>
+    </p:extLst>
+  </p:cSld>
+  <p:clrMapOvr>
+    <a:masterClrMapping/>
+  </p:clrMapOvr>
+</p:notes>
+</file>
+
+<file path=ppt/notesSlides/notesSlide4.xml><?xml version="1.0" encoding="utf-8"?>
+<p:notes xmlns:a="http://schemas.openxmlformats.org/drawingml/2006/main" xmlns:r="http://schemas.openxmlformats.org/officeDocument/2006/relationships" xmlns:p="http://schemas.openxmlformats.org/presentationml/2006/main">
+  <p:cSld>
+    <p:spTree>
+      <p:nvGrpSpPr>
+        <p:cNvPr id="1" name=""/>
+        <p:cNvGrpSpPr/>
+        <p:nvPr/>
+      </p:nvGrpSpPr>
+      <p:grpSpPr>
+        <a:xfrm>
+          <a:off x="0" y="0"/>
+          <a:ext cx="0" cy="0"/>
+          <a:chOff x="0" y="0"/>
+          <a:chExt cx="0" cy="0"/>
+        </a:xfrm>
+      </p:grpSpPr>
+      <p:sp>
+        <p:nvSpPr>
+          <p:cNvPr id="2" name="Espace réservé de l'image des diapositives 1"/>
+          <p:cNvSpPr>
+            <a:spLocks noGrp="1" noRot="1" noChangeAspect="1"/>
+          </p:cNvSpPr>
+          <p:nvPr>
+            <p:ph type="sldImg"/>
+          </p:nvPr>
+        </p:nvSpPr>
+        <p:spPr/>
+      </p:sp>
+      <p:sp>
+        <p:nvSpPr>
+          <p:cNvPr id="3" name="Espace réservé des commentaires 2"/>
+          <p:cNvSpPr>
+            <a:spLocks noGrp="1"/>
+          </p:cNvSpPr>
+          <p:nvPr>
+            <p:ph type="body" idx="1"/>
+          </p:nvPr>
+        </p:nvSpPr>
+        <p:spPr/>
+        <p:txBody>
+          <a:bodyPr/>
+          <a:lstStyle/>
+          <a:p>
+            <a:r>
+              <a:rPr lang="fr-CH" dirty="0" smtClean="0"/>
+              <a:t>Armand</a:t>
+            </a:r>
+            <a:endParaRPr lang="fr-CH" dirty="0"/>
+          </a:p>
+        </p:txBody>
+      </p:sp>
+      <p:sp>
+        <p:nvSpPr>
+          <p:cNvPr id="4" name="Espace réservé du numéro de diapositive 3"/>
+          <p:cNvSpPr>
+            <a:spLocks noGrp="1"/>
+          </p:cNvSpPr>
+          <p:nvPr>
+            <p:ph type="sldNum" sz="quarter" idx="10"/>
+          </p:nvPr>
+        </p:nvSpPr>
+        <p:spPr/>
+        <p:txBody>
+          <a:bodyPr/>
+          <a:lstStyle/>
+          <a:p>
+            <a:fld id="{9CEEF3C3-BA39-4E5D-9C35-E64B6F5C9CA2}" type="slidenum">
+              <a:rPr lang="fr-CH" smtClean="0"/>
+              <a:t>4</a:t>
+            </a:fld>
+            <a:endParaRPr lang="fr-CH"/>
+          </a:p>
+        </p:txBody>
+      </p:sp>
+    </p:spTree>
+    <p:extLst>
+      <p:ext uri="{BB962C8B-B14F-4D97-AF65-F5344CB8AC3E}">
+        <p14:creationId xmlns:p14="http://schemas.microsoft.com/office/powerpoint/2010/main" val="3957070806"/>
+      </p:ext>
+    </p:extLst>
+  </p:cSld>
+  <p:clrMapOvr>
+    <a:masterClrMapping/>
+  </p:clrMapOvr>
+</p:notes>
+</file>
+
+<file path=ppt/notesSlides/notesSlide5.xml><?xml version="1.0" encoding="utf-8"?>
+<p:notes xmlns:a="http://schemas.openxmlformats.org/drawingml/2006/main" xmlns:r="http://schemas.openxmlformats.org/officeDocument/2006/relationships" xmlns:p="http://schemas.openxmlformats.org/presentationml/2006/main">
+  <p:cSld>
+    <p:spTree>
+      <p:nvGrpSpPr>
+        <p:cNvPr id="1" name=""/>
+        <p:cNvGrpSpPr/>
+        <p:nvPr/>
+      </p:nvGrpSpPr>
+      <p:grpSpPr>
+        <a:xfrm>
+          <a:off x="0" y="0"/>
+          <a:ext cx="0" cy="0"/>
+          <a:chOff x="0" y="0"/>
+          <a:chExt cx="0" cy="0"/>
+        </a:xfrm>
+      </p:grpSpPr>
+      <p:sp>
+        <p:nvSpPr>
+          <p:cNvPr id="2" name="Espace réservé de l'image des diapositives 1"/>
+          <p:cNvSpPr>
+            <a:spLocks noGrp="1" noRot="1" noChangeAspect="1"/>
+          </p:cNvSpPr>
+          <p:nvPr>
+            <p:ph type="sldImg"/>
+          </p:nvPr>
+        </p:nvSpPr>
+        <p:spPr/>
+      </p:sp>
+      <p:sp>
+        <p:nvSpPr>
+          <p:cNvPr id="3" name="Espace réservé des commentaires 2"/>
+          <p:cNvSpPr>
+            <a:spLocks noGrp="1"/>
+          </p:cNvSpPr>
+          <p:nvPr>
+            <p:ph type="body" idx="1"/>
+          </p:nvPr>
+        </p:nvSpPr>
+        <p:spPr/>
+        <p:txBody>
+          <a:bodyPr/>
+          <a:lstStyle/>
+          <a:p>
+            <a:r>
+              <a:rPr lang="fr-CH" dirty="0" smtClean="0"/>
+              <a:t>Benoit</a:t>
+            </a:r>
+            <a:endParaRPr lang="fr-CH" dirty="0"/>
+          </a:p>
+        </p:txBody>
+      </p:sp>
+      <p:sp>
+        <p:nvSpPr>
+          <p:cNvPr id="4" name="Espace réservé du numéro de diapositive 3"/>
+          <p:cNvSpPr>
+            <a:spLocks noGrp="1"/>
+          </p:cNvSpPr>
+          <p:nvPr>
+            <p:ph type="sldNum" sz="quarter" idx="10"/>
+          </p:nvPr>
+        </p:nvSpPr>
+        <p:spPr/>
+        <p:txBody>
+          <a:bodyPr/>
+          <a:lstStyle/>
+          <a:p>
+            <a:fld id="{9CEEF3C3-BA39-4E5D-9C35-E64B6F5C9CA2}" type="slidenum">
+              <a:rPr lang="fr-CH" smtClean="0"/>
+              <a:t>5</a:t>
+            </a:fld>
+            <a:endParaRPr lang="fr-CH"/>
+          </a:p>
+        </p:txBody>
+      </p:sp>
+    </p:spTree>
+    <p:extLst>
+      <p:ext uri="{BB962C8B-B14F-4D97-AF65-F5344CB8AC3E}">
+        <p14:creationId xmlns:p14="http://schemas.microsoft.com/office/powerpoint/2010/main" val="749411901"/>
+      </p:ext>
+    </p:extLst>
+  </p:cSld>
+  <p:clrMapOvr>
+    <a:masterClrMapping/>
+  </p:clrMapOvr>
+</p:notes>
+</file>
+
+<file path=ppt/notesSlides/notesSlide6.xml><?xml version="1.0" encoding="utf-8"?>
+<p:notes xmlns:a="http://schemas.openxmlformats.org/drawingml/2006/main" xmlns:r="http://schemas.openxmlformats.org/officeDocument/2006/relationships" xmlns:p="http://schemas.openxmlformats.org/presentationml/2006/main">
+  <p:cSld>
+    <p:spTree>
+      <p:nvGrpSpPr>
+        <p:cNvPr id="1" name=""/>
+        <p:cNvGrpSpPr/>
+        <p:nvPr/>
+      </p:nvGrpSpPr>
+      <p:grpSpPr>
+        <a:xfrm>
+          <a:off x="0" y="0"/>
+          <a:ext cx="0" cy="0"/>
+          <a:chOff x="0" y="0"/>
+          <a:chExt cx="0" cy="0"/>
+        </a:xfrm>
+      </p:grpSpPr>
+      <p:sp>
+        <p:nvSpPr>
+          <p:cNvPr id="2" name="Espace réservé de l'image des diapositives 1"/>
+          <p:cNvSpPr>
+            <a:spLocks noGrp="1" noRot="1" noChangeAspect="1"/>
+          </p:cNvSpPr>
+          <p:nvPr>
+            <p:ph type="sldImg"/>
+          </p:nvPr>
+        </p:nvSpPr>
+        <p:spPr/>
+      </p:sp>
+      <p:sp>
+        <p:nvSpPr>
+          <p:cNvPr id="3" name="Espace réservé des commentaires 2"/>
+          <p:cNvSpPr>
+            <a:spLocks noGrp="1"/>
+          </p:cNvSpPr>
+          <p:nvPr>
+            <p:ph type="body" idx="1"/>
+          </p:nvPr>
+        </p:nvSpPr>
+        <p:spPr/>
+        <p:txBody>
+          <a:bodyPr/>
+          <a:lstStyle/>
+          <a:p>
+            <a:r>
+              <a:rPr lang="fr-CH" dirty="0" smtClean="0"/>
+              <a:t>Armand</a:t>
+            </a:r>
+            <a:endParaRPr lang="fr-CH" dirty="0"/>
+          </a:p>
+        </p:txBody>
+      </p:sp>
+      <p:sp>
+        <p:nvSpPr>
+          <p:cNvPr id="4" name="Espace réservé du numéro de diapositive 3"/>
+          <p:cNvSpPr>
+            <a:spLocks noGrp="1"/>
+          </p:cNvSpPr>
+          <p:nvPr>
+            <p:ph type="sldNum" sz="quarter" idx="10"/>
+          </p:nvPr>
+        </p:nvSpPr>
+        <p:spPr/>
+        <p:txBody>
+          <a:bodyPr/>
+          <a:lstStyle/>
+          <a:p>
+            <a:fld id="{9CEEF3C3-BA39-4E5D-9C35-E64B6F5C9CA2}" type="slidenum">
+              <a:rPr lang="fr-CH" smtClean="0"/>
+              <a:t>6</a:t>
+            </a:fld>
+            <a:endParaRPr lang="fr-CH"/>
+          </a:p>
+        </p:txBody>
+      </p:sp>
+    </p:spTree>
+    <p:extLst>
+      <p:ext uri="{BB962C8B-B14F-4D97-AF65-F5344CB8AC3E}">
+        <p14:creationId xmlns:p14="http://schemas.microsoft.com/office/powerpoint/2010/main" val="1206149035"/>
+      </p:ext>
+    </p:extLst>
+  </p:cSld>
+  <p:clrMapOvr>
+    <a:masterClrMapping/>
+  </p:clrMapOvr>
+</p:notes>
+</file>
+
+<file path=ppt/notesSlides/notesSlide7.xml><?xml version="1.0" encoding="utf-8"?>
+<p:notes xmlns:a="http://schemas.openxmlformats.org/drawingml/2006/main" xmlns:r="http://schemas.openxmlformats.org/officeDocument/2006/relationships" xmlns:p="http://schemas.openxmlformats.org/presentationml/2006/main">
+  <p:cSld>
+    <p:spTree>
+      <p:nvGrpSpPr>
+        <p:cNvPr id="1" name=""/>
+        <p:cNvGrpSpPr/>
+        <p:nvPr/>
+      </p:nvGrpSpPr>
+      <p:grpSpPr>
+        <a:xfrm>
+          <a:off x="0" y="0"/>
+          <a:ext cx="0" cy="0"/>
+          <a:chOff x="0" y="0"/>
+          <a:chExt cx="0" cy="0"/>
+        </a:xfrm>
+      </p:grpSpPr>
+      <p:sp>
+        <p:nvSpPr>
+          <p:cNvPr id="2" name="Espace réservé de l'image des diapositives 1"/>
+          <p:cNvSpPr>
+            <a:spLocks noGrp="1" noRot="1" noChangeAspect="1"/>
+          </p:cNvSpPr>
+          <p:nvPr>
+            <p:ph type="sldImg"/>
+          </p:nvPr>
+        </p:nvSpPr>
+        <p:spPr/>
+      </p:sp>
+      <p:sp>
+        <p:nvSpPr>
+          <p:cNvPr id="3" name="Espace réservé des commentaires 2"/>
+          <p:cNvSpPr>
+            <a:spLocks noGrp="1"/>
+          </p:cNvSpPr>
+          <p:nvPr>
+            <p:ph type="body" idx="1"/>
+          </p:nvPr>
+        </p:nvSpPr>
+        <p:spPr/>
+        <p:txBody>
+          <a:bodyPr/>
+          <a:lstStyle/>
+          <a:p>
+            <a:r>
+              <a:rPr lang="fr-CH" dirty="0" smtClean="0"/>
+              <a:t>Armand</a:t>
+            </a:r>
+            <a:endParaRPr lang="fr-CH" dirty="0"/>
+          </a:p>
+        </p:txBody>
+      </p:sp>
+      <p:sp>
+        <p:nvSpPr>
+          <p:cNvPr id="4" name="Espace réservé du numéro de diapositive 3"/>
+          <p:cNvSpPr>
+            <a:spLocks noGrp="1"/>
+          </p:cNvSpPr>
+          <p:nvPr>
+            <p:ph type="sldNum" sz="quarter" idx="10"/>
+          </p:nvPr>
+        </p:nvSpPr>
+        <p:spPr/>
+        <p:txBody>
+          <a:bodyPr/>
+          <a:lstStyle/>
+          <a:p>
+            <a:fld id="{9CEEF3C3-BA39-4E5D-9C35-E64B6F5C9CA2}" type="slidenum">
+              <a:rPr lang="fr-CH" smtClean="0"/>
+              <a:t>7</a:t>
+            </a:fld>
+            <a:endParaRPr lang="fr-CH"/>
+          </a:p>
+        </p:txBody>
+      </p:sp>
+    </p:spTree>
+    <p:extLst>
+      <p:ext uri="{BB962C8B-B14F-4D97-AF65-F5344CB8AC3E}">
+        <p14:creationId xmlns:p14="http://schemas.microsoft.com/office/powerpoint/2010/main" val="2945364927"/>
+      </p:ext>
+    </p:extLst>
+  </p:cSld>
+  <p:clrMapOvr>
+    <a:masterClrMapping/>
+  </p:clrMapOvr>
+</p:notes>
+</file>
+
+<file path=ppt/notesSlides/notesSlide8.xml><?xml version="1.0" encoding="utf-8"?>
+<p:notes xmlns:a="http://schemas.openxmlformats.org/drawingml/2006/main" xmlns:r="http://schemas.openxmlformats.org/officeDocument/2006/relationships" xmlns:p="http://schemas.openxmlformats.org/presentationml/2006/main">
+  <p:cSld>
+    <p:spTree>
+      <p:nvGrpSpPr>
+        <p:cNvPr id="1" name=""/>
+        <p:cNvGrpSpPr/>
+        <p:nvPr/>
+      </p:nvGrpSpPr>
+      <p:grpSpPr>
+        <a:xfrm>
+          <a:off x="0" y="0"/>
+          <a:ext cx="0" cy="0"/>
+          <a:chOff x="0" y="0"/>
+          <a:chExt cx="0" cy="0"/>
+        </a:xfrm>
+      </p:grpSpPr>
+      <p:sp>
+        <p:nvSpPr>
+          <p:cNvPr id="2" name="Espace réservé de l'image des diapositives 1"/>
+          <p:cNvSpPr>
+            <a:spLocks noGrp="1" noRot="1" noChangeAspect="1"/>
+          </p:cNvSpPr>
+          <p:nvPr>
+            <p:ph type="sldImg"/>
+          </p:nvPr>
+        </p:nvSpPr>
+        <p:spPr/>
+      </p:sp>
+      <p:sp>
+        <p:nvSpPr>
+          <p:cNvPr id="3" name="Espace réservé des commentaires 2"/>
+          <p:cNvSpPr>
+            <a:spLocks noGrp="1"/>
+          </p:cNvSpPr>
+          <p:nvPr>
+            <p:ph type="body" idx="1"/>
+          </p:nvPr>
+        </p:nvSpPr>
+        <p:spPr/>
+        <p:txBody>
+          <a:bodyPr/>
+          <a:lstStyle/>
+          <a:p>
+            <a:r>
+              <a:rPr lang="fr-CH" dirty="0" smtClean="0"/>
+              <a:t>Wilfried</a:t>
+            </a:r>
+            <a:endParaRPr lang="fr-CH" dirty="0"/>
+          </a:p>
+        </p:txBody>
+      </p:sp>
+      <p:sp>
+        <p:nvSpPr>
+          <p:cNvPr id="4" name="Espace réservé du numéro de diapositive 3"/>
+          <p:cNvSpPr>
+            <a:spLocks noGrp="1"/>
+          </p:cNvSpPr>
+          <p:nvPr>
+            <p:ph type="sldNum" sz="quarter" idx="10"/>
+          </p:nvPr>
+        </p:nvSpPr>
+        <p:spPr/>
+        <p:txBody>
+          <a:bodyPr/>
+          <a:lstStyle/>
+          <a:p>
+            <a:fld id="{9CEEF3C3-BA39-4E5D-9C35-E64B6F5C9CA2}" type="slidenum">
+              <a:rPr lang="fr-CH" smtClean="0"/>
+              <a:t>8</a:t>
+            </a:fld>
+            <a:endParaRPr lang="fr-CH"/>
+          </a:p>
+        </p:txBody>
+      </p:sp>
+    </p:spTree>
+    <p:extLst>
+      <p:ext uri="{BB962C8B-B14F-4D97-AF65-F5344CB8AC3E}">
+        <p14:creationId xmlns:p14="http://schemas.microsoft.com/office/powerpoint/2010/main" val="2213137755"/>
+      </p:ext>
+    </p:extLst>
+  </p:cSld>
+  <p:clrMapOvr>
+    <a:masterClrMapping/>
+  </p:clrMapOvr>
+</p:notes>
+</file>
+
+<file path=ppt/notesSlides/notesSlide9.xml><?xml version="1.0" encoding="utf-8"?>
+<p:notes xmlns:a="http://schemas.openxmlformats.org/drawingml/2006/main" xmlns:r="http://schemas.openxmlformats.org/officeDocument/2006/relationships" xmlns:p="http://schemas.openxmlformats.org/presentationml/2006/main">
+  <p:cSld>
+    <p:spTree>
+      <p:nvGrpSpPr>
+        <p:cNvPr id="1" name=""/>
+        <p:cNvGrpSpPr/>
+        <p:nvPr/>
+      </p:nvGrpSpPr>
+      <p:grpSpPr>
+        <a:xfrm>
+          <a:off x="0" y="0"/>
+          <a:ext cx="0" cy="0"/>
+          <a:chOff x="0" y="0"/>
+          <a:chExt cx="0" cy="0"/>
+        </a:xfrm>
+      </p:grpSpPr>
+      <p:sp>
+        <p:nvSpPr>
+          <p:cNvPr id="2" name="Espace réservé de l'image des diapositives 1"/>
+          <p:cNvSpPr>
+            <a:spLocks noGrp="1" noRot="1" noChangeAspect="1"/>
+          </p:cNvSpPr>
+          <p:nvPr>
+            <p:ph type="sldImg"/>
+          </p:nvPr>
+        </p:nvSpPr>
+        <p:spPr/>
+      </p:sp>
+      <p:sp>
+        <p:nvSpPr>
+          <p:cNvPr id="3" name="Espace réservé des commentaires 2"/>
+          <p:cNvSpPr>
+            <a:spLocks noGrp="1"/>
+          </p:cNvSpPr>
+          <p:nvPr>
+            <p:ph type="body" idx="1"/>
+          </p:nvPr>
+        </p:nvSpPr>
+        <p:spPr/>
+        <p:txBody>
+          <a:bodyPr/>
+          <a:lstStyle/>
+          <a:p>
+            <a:r>
+              <a:rPr lang="fr-CH" dirty="0" smtClean="0"/>
+              <a:t>Simon</a:t>
+            </a:r>
+            <a:endParaRPr lang="fr-CH" dirty="0"/>
+          </a:p>
+        </p:txBody>
+      </p:sp>
+      <p:sp>
+        <p:nvSpPr>
+          <p:cNvPr id="4" name="Espace réservé du numéro de diapositive 3"/>
+          <p:cNvSpPr>
+            <a:spLocks noGrp="1"/>
+          </p:cNvSpPr>
+          <p:nvPr>
+            <p:ph type="sldNum" sz="quarter" idx="10"/>
+          </p:nvPr>
+        </p:nvSpPr>
+        <p:spPr/>
+        <p:txBody>
+          <a:bodyPr/>
+          <a:lstStyle/>
+          <a:p>
+            <a:fld id="{9CEEF3C3-BA39-4E5D-9C35-E64B6F5C9CA2}" type="slidenum">
+              <a:rPr lang="fr-CH" smtClean="0"/>
+              <a:t>9</a:t>
+            </a:fld>
+            <a:endParaRPr lang="fr-CH"/>
+          </a:p>
+        </p:txBody>
+      </p:sp>
+    </p:spTree>
+    <p:extLst>
+      <p:ext uri="{BB962C8B-B14F-4D97-AF65-F5344CB8AC3E}">
+        <p14:creationId xmlns:p14="http://schemas.microsoft.com/office/powerpoint/2010/main" val="2785459443"/>
+      </p:ext>
+    </p:extLst>
+  </p:cSld>
+  <p:clrMapOvr>
+    <a:masterClrMapping/>
+  </p:clrMapOvr>
+</p:notes>
 </file>
 
 <file path=ppt/slideLayouts/slideLayout1.xml><?xml version="1.0" encoding="utf-8"?>
@@ -531,7 +1941,7 @@
             <a:fld id="{5BBF241E-D95D-F947-BD40-BA0B1092A59D}" type="datetimeFigureOut">
               <a:rPr lang="fr-FR" smtClean="0"/>
               <a:pPr/>
-              <a:t>18/06/2015</a:t>
+              <a:t>19/06/2015</a:t>
             </a:fld>
             <a:endParaRPr lang="fr-FR"/>
           </a:p>
@@ -811,7 +2221,7 @@
             <a:fld id="{5BBF241E-D95D-F947-BD40-BA0B1092A59D}" type="datetimeFigureOut">
               <a:rPr lang="fr-FR" smtClean="0"/>
               <a:pPr/>
-              <a:t>18/06/2015</a:t>
+              <a:t>19/06/2015</a:t>
             </a:fld>
             <a:endParaRPr lang="fr-FR"/>
           </a:p>
@@ -1091,7 +2501,7 @@
             <a:fld id="{5BBF241E-D95D-F947-BD40-BA0B1092A59D}" type="datetimeFigureOut">
               <a:rPr lang="fr-FR" smtClean="0"/>
               <a:pPr/>
-              <a:t>18/06/2015</a:t>
+              <a:t>19/06/2015</a:t>
             </a:fld>
             <a:endParaRPr lang="fr-FR"/>
           </a:p>
@@ -1328,7 +2738,7 @@
             <a:fld id="{5BBF241E-D95D-F947-BD40-BA0B1092A59D}" type="datetimeFigureOut">
               <a:rPr lang="fr-FR" smtClean="0"/>
               <a:pPr/>
-              <a:t>18/06/2015</a:t>
+              <a:t>19/06/2015</a:t>
             </a:fld>
             <a:endParaRPr lang="fr-FR"/>
           </a:p>
@@ -1710,7 +3120,7 @@
             <a:fld id="{5BBF241E-D95D-F947-BD40-BA0B1092A59D}" type="datetimeFigureOut">
               <a:rPr lang="fr-FR" smtClean="0"/>
               <a:pPr/>
-              <a:t>18/06/2015</a:t>
+              <a:t>19/06/2015</a:t>
             </a:fld>
             <a:endParaRPr lang="fr-FR"/>
           </a:p>
@@ -2061,7 +3471,7 @@
             <a:fld id="{5BBF241E-D95D-F947-BD40-BA0B1092A59D}" type="datetimeFigureOut">
               <a:rPr lang="fr-FR" smtClean="0"/>
               <a:pPr/>
-              <a:t>18/06/2015</a:t>
+              <a:t>19/06/2015</a:t>
             </a:fld>
             <a:endParaRPr lang="fr-FR"/>
           </a:p>
@@ -2587,7 +3997,7 @@
             <a:fld id="{5BBF241E-D95D-F947-BD40-BA0B1092A59D}" type="datetimeFigureOut">
               <a:rPr lang="fr-FR" smtClean="0"/>
               <a:pPr/>
-              <a:t>18/06/2015</a:t>
+              <a:t>19/06/2015</a:t>
             </a:fld>
             <a:endParaRPr lang="fr-FR"/>
           </a:p>
@@ -2871,7 +4281,7 @@
             <a:fld id="{5BBF241E-D95D-F947-BD40-BA0B1092A59D}" type="datetimeFigureOut">
               <a:rPr lang="fr-FR" smtClean="0"/>
               <a:pPr/>
-              <a:t>18/06/2015</a:t>
+              <a:t>19/06/2015</a:t>
             </a:fld>
             <a:endParaRPr lang="fr-FR"/>
           </a:p>
@@ -3119,7 +4529,7 @@
             <a:fld id="{5BBF241E-D95D-F947-BD40-BA0B1092A59D}" type="datetimeFigureOut">
               <a:rPr lang="fr-FR" smtClean="0"/>
               <a:pPr/>
-              <a:t>18/06/2015</a:t>
+              <a:t>19/06/2015</a:t>
             </a:fld>
             <a:endParaRPr lang="fr-FR"/>
           </a:p>
@@ -3308,7 +4718,7 @@
             <a:fld id="{5BBF241E-D95D-F947-BD40-BA0B1092A59D}" type="datetimeFigureOut">
               <a:rPr lang="fr-FR" smtClean="0"/>
               <a:pPr/>
-              <a:t>18/06/2015</a:t>
+              <a:t>19/06/2015</a:t>
             </a:fld>
             <a:endParaRPr lang="fr-FR"/>
           </a:p>
@@ -3663,7 +5073,7 @@
             <a:fld id="{5BBF241E-D95D-F947-BD40-BA0B1092A59D}" type="datetimeFigureOut">
               <a:rPr lang="fr-FR" smtClean="0"/>
               <a:pPr/>
-              <a:t>18/06/2015</a:t>
+              <a:t>19/06/2015</a:t>
             </a:fld>
             <a:endParaRPr lang="fr-FR"/>
           </a:p>
@@ -4162,6 +5572,14 @@
   <p:clrMapOvr>
     <a:masterClrMapping/>
   </p:clrMapOvr>
+  <mc:AlternateContent xmlns:mc="http://schemas.openxmlformats.org/markup-compatibility/2006">
+    <mc:Choice xmlns:p14="http://schemas.microsoft.com/office/powerpoint/2010/main" Requires="p14">
+      <p:transition p14:dur="0"/>
+    </mc:Choice>
+    <mc:Fallback>
+      <p:transition/>
+    </mc:Fallback>
+  </mc:AlternateContent>
   <p:timing>
     <p:tnLst>
       <p:par>
@@ -4191,12 +5609,12 @@
       </p:grpSpPr>
       <p:sp>
         <p:nvSpPr>
-          <p:cNvPr id="2" name="Titre 1"/>
-          <p:cNvSpPr>
-            <a:spLocks noGrp="1"/>
-          </p:cNvSpPr>
-          <p:nvPr>
-            <p:ph type="title"/>
+          <p:cNvPr id="3" name="Espace réservé du contenu 2"/>
+          <p:cNvSpPr>
+            <a:spLocks noGrp="1"/>
+          </p:cNvSpPr>
+          <p:nvPr>
+            <p:ph idx="1"/>
           </p:nvPr>
         </p:nvSpPr>
         <p:spPr/>
@@ -4204,21 +5622,40 @@
           <a:bodyPr/>
           <a:lstStyle/>
           <a:p>
-            <a:endParaRPr lang="fr-FR"/>
-          </a:p>
-        </p:txBody>
-      </p:sp>
-      <p:sp>
-        <p:nvSpPr>
-          <p:cNvPr id="3" name="Espace réservé pour une image  2"/>
-          <p:cNvSpPr>
-            <a:spLocks noGrp="1"/>
-          </p:cNvSpPr>
-          <p:nvPr>
-            <p:ph type="pic" idx="1"/>
-          </p:nvPr>
-        </p:nvSpPr>
-        <p:spPr/>
+            <a:r>
+              <a:rPr lang="fr-FR" dirty="0" smtClean="0"/>
+              <a:t>Le mode observateur</a:t>
+            </a:r>
+          </a:p>
+          <a:p>
+            <a:endParaRPr lang="fr-FR" dirty="0" smtClean="0"/>
+          </a:p>
+          <a:p>
+            <a:r>
+              <a:rPr lang="fr-FR" dirty="0" smtClean="0"/>
+              <a:t>Le choix du tank en début de partie</a:t>
+            </a:r>
+          </a:p>
+          <a:p>
+            <a:endParaRPr lang="fr-FR" dirty="0" smtClean="0"/>
+          </a:p>
+          <a:p>
+            <a:r>
+              <a:rPr lang="fr-FR" dirty="0" smtClean="0"/>
+              <a:t>Le choix de la carte</a:t>
+            </a:r>
+          </a:p>
+          <a:p>
+            <a:endParaRPr lang="fr-FR" dirty="0"/>
+          </a:p>
+          <a:p>
+            <a:r>
+              <a:rPr lang="fr-FR" dirty="0" smtClean="0"/>
+              <a:t>Les objets destructibles</a:t>
+            </a:r>
+            <a:endParaRPr lang="fr-FR" dirty="0" smtClean="0"/>
+          </a:p>
+        </p:txBody>
       </p:sp>
       <p:sp>
         <p:nvSpPr>
@@ -4227,66 +5664,42 @@
             <a:spLocks noGrp="1"/>
           </p:cNvSpPr>
           <p:nvPr>
-            <p:ph type="body" sz="half" idx="2"/>
-          </p:nvPr>
-        </p:nvSpPr>
-        <p:spPr/>
-        <p:txBody>
-          <a:bodyPr/>
+            <p:ph type="body" sz="quarter" idx="13"/>
+          </p:nvPr>
+        </p:nvSpPr>
+        <p:spPr>
+          <a:xfrm>
+            <a:off x="317420" y="114259"/>
+            <a:ext cx="5760000" cy="516874"/>
+          </a:xfrm>
+        </p:spPr>
+        <p:txBody>
+          <a:bodyPr anchor="ctr">
+            <a:noAutofit/>
+          </a:bodyPr>
           <a:lstStyle/>
           <a:p>
-            <a:endParaRPr lang="fr-FR" dirty="0"/>
-          </a:p>
-        </p:txBody>
-      </p:sp>
-      <p:sp>
-        <p:nvSpPr>
-          <p:cNvPr id="5" name="Espace réservé du texte 4"/>
-          <p:cNvSpPr>
-            <a:spLocks noGrp="1"/>
-          </p:cNvSpPr>
-          <p:nvPr>
-            <p:ph type="body" sz="quarter" idx="14"/>
-          </p:nvPr>
-        </p:nvSpPr>
-        <p:spPr/>
-        <p:txBody>
-          <a:bodyPr/>
-          <a:lstStyle/>
-          <a:p>
-            <a:endParaRPr lang="fr-FR"/>
-          </a:p>
-        </p:txBody>
-      </p:sp>
-      <p:sp>
-        <p:nvSpPr>
-          <p:cNvPr id="6" name="Espace réservé du texte 5"/>
-          <p:cNvSpPr>
-            <a:spLocks noGrp="1"/>
-          </p:cNvSpPr>
-          <p:nvPr>
-            <p:ph type="body" sz="quarter" idx="15"/>
-          </p:nvPr>
-        </p:nvSpPr>
-        <p:spPr/>
-        <p:txBody>
-          <a:bodyPr/>
-          <a:lstStyle/>
-          <a:p>
-            <a:endParaRPr lang="fr-FR"/>
+            <a:r>
+              <a:rPr lang="fr-FR" sz="2400" dirty="0" smtClean="0"/>
+              <a:t>Fonctionnalités abandonnées</a:t>
+            </a:r>
+            <a:endParaRPr lang="fr-FR" sz="2400" dirty="0"/>
           </a:p>
         </p:txBody>
       </p:sp>
     </p:spTree>
     <p:extLst>
       <p:ext uri="{BB962C8B-B14F-4D97-AF65-F5344CB8AC3E}">
-        <p14:creationId xmlns:p14="http://schemas.microsoft.com/office/powerpoint/2010/main" val="3298095456"/>
+        <p14:creationId xmlns:p14="http://schemas.microsoft.com/office/powerpoint/2010/main" val="3131559351"/>
       </p:ext>
     </p:extLst>
   </p:cSld>
   <p:clrMapOvr>
     <a:masterClrMapping/>
   </p:clrMapOvr>
+  <p:transition spd="slow">
+    <p:push dir="u"/>
+  </p:transition>
   <p:timing>
     <p:tnLst>
       <p:par>
@@ -4316,12 +5729,12 @@
       </p:grpSpPr>
       <p:sp>
         <p:nvSpPr>
-          <p:cNvPr id="2" name="Titre 1"/>
-          <p:cNvSpPr>
-            <a:spLocks noGrp="1"/>
-          </p:cNvSpPr>
-          <p:nvPr>
-            <p:ph type="title"/>
+          <p:cNvPr id="3" name="Espace réservé du contenu 2"/>
+          <p:cNvSpPr>
+            <a:spLocks noGrp="1"/>
+          </p:cNvSpPr>
+          <p:nvPr>
+            <p:ph idx="1"/>
           </p:nvPr>
         </p:nvSpPr>
         <p:spPr/>
@@ -4330,46 +5743,91 @@
           <a:lstStyle/>
           <a:p>
             <a:r>
-              <a:rPr lang="fr-FR" cap="small" dirty="0" err="1" smtClean="0"/>
-              <a:t>WarTanks</a:t>
-            </a:r>
-            <a:endParaRPr lang="fr-FR" cap="small" dirty="0"/>
-          </a:p>
-        </p:txBody>
-      </p:sp>
-      <p:sp>
-        <p:nvSpPr>
-          <p:cNvPr id="3" name="Sous-titre 2"/>
-          <p:cNvSpPr>
-            <a:spLocks noGrp="1"/>
-          </p:cNvSpPr>
-          <p:nvPr>
-            <p:ph type="subTitle" idx="13"/>
-          </p:nvPr>
-        </p:nvSpPr>
-        <p:spPr/>
-        <p:txBody>
-          <a:bodyPr/>
+              <a:rPr lang="fr-FR" dirty="0" smtClean="0"/>
+              <a:t>La gestion des collisions</a:t>
+            </a:r>
+          </a:p>
+          <a:p>
+            <a:endParaRPr lang="fr-FR" dirty="0" smtClean="0"/>
+          </a:p>
+          <a:p>
+            <a:r>
+              <a:rPr lang="fr-FR" dirty="0" err="1" smtClean="0"/>
+              <a:t>Debug</a:t>
+            </a:r>
+            <a:r>
+              <a:rPr lang="fr-FR" dirty="0" smtClean="0"/>
+              <a:t> de la communication client-serveur</a:t>
+            </a:r>
+            <a:endParaRPr lang="fr-FR" dirty="0"/>
+          </a:p>
+          <a:p>
+            <a:endParaRPr lang="fr-FR" dirty="0"/>
+          </a:p>
+          <a:p>
+            <a:r>
+              <a:rPr lang="fr-FR" dirty="0" err="1" smtClean="0"/>
+              <a:t>Merge</a:t>
+            </a:r>
+            <a:r>
+              <a:rPr lang="fr-FR" dirty="0" smtClean="0"/>
+              <a:t> entre client et serveur</a:t>
+            </a:r>
+          </a:p>
+          <a:p>
+            <a:endParaRPr lang="fr-FR" dirty="0"/>
+          </a:p>
+          <a:p>
+            <a:r>
+              <a:rPr lang="fr-FR" dirty="0" smtClean="0"/>
+              <a:t>Coordination de l’équipe</a:t>
+            </a:r>
+          </a:p>
+        </p:txBody>
+      </p:sp>
+      <p:sp>
+        <p:nvSpPr>
+          <p:cNvPr id="4" name="Espace réservé du texte 3"/>
+          <p:cNvSpPr>
+            <a:spLocks noGrp="1"/>
+          </p:cNvSpPr>
+          <p:nvPr>
+            <p:ph type="body" sz="quarter" idx="13"/>
+          </p:nvPr>
+        </p:nvSpPr>
+        <p:spPr>
+          <a:xfrm>
+            <a:off x="317420" y="114259"/>
+            <a:ext cx="5760000" cy="516874"/>
+          </a:xfrm>
+        </p:spPr>
+        <p:txBody>
+          <a:bodyPr anchor="ctr">
+            <a:noAutofit/>
+          </a:bodyPr>
           <a:lstStyle/>
           <a:p>
             <a:r>
-              <a:rPr lang="fr-FR" dirty="0" smtClean="0"/>
-              <a:t>Projet de GEN</a:t>
-            </a:r>
-            <a:endParaRPr lang="fr-FR" dirty="0"/>
+              <a:rPr lang="fr-FR" sz="2400" dirty="0" smtClean="0"/>
+              <a:t>Difficultés rencontrées</a:t>
+            </a:r>
+            <a:endParaRPr lang="fr-FR" sz="2400" dirty="0"/>
           </a:p>
         </p:txBody>
       </p:sp>
     </p:spTree>
     <p:extLst>
       <p:ext uri="{BB962C8B-B14F-4D97-AF65-F5344CB8AC3E}">
-        <p14:creationId xmlns:p14="http://schemas.microsoft.com/office/powerpoint/2010/main" val="3581340210"/>
+        <p14:creationId xmlns:p14="http://schemas.microsoft.com/office/powerpoint/2010/main" val="633489205"/>
       </p:ext>
     </p:extLst>
   </p:cSld>
   <p:clrMapOvr>
     <a:masterClrMapping/>
   </p:clrMapOvr>
+  <p:transition spd="slow">
+    <p:push dir="u"/>
+  </p:transition>
   <p:timing>
     <p:tnLst>
       <p:par>
@@ -4399,12 +5857,12 @@
       </p:grpSpPr>
       <p:sp>
         <p:nvSpPr>
-          <p:cNvPr id="2" name="Espace réservé du texte 1"/>
-          <p:cNvSpPr>
-            <a:spLocks noGrp="1"/>
-          </p:cNvSpPr>
-          <p:nvPr>
-            <p:ph type="body" sz="quarter" idx="14"/>
+          <p:cNvPr id="3" name="Espace réservé du contenu 2"/>
+          <p:cNvSpPr>
+            <a:spLocks noGrp="1"/>
+          </p:cNvSpPr>
+          <p:nvPr>
+            <p:ph idx="1"/>
           </p:nvPr>
         </p:nvSpPr>
         <p:spPr/>
@@ -4412,39 +5870,164 @@
           <a:bodyPr/>
           <a:lstStyle/>
           <a:p>
-            <a:endParaRPr lang="fr-FR"/>
-          </a:p>
-        </p:txBody>
-      </p:sp>
-      <p:sp>
-        <p:nvSpPr>
-          <p:cNvPr id="3" name="Espace réservé du texte 2"/>
-          <p:cNvSpPr>
-            <a:spLocks noGrp="1"/>
-          </p:cNvSpPr>
-          <p:nvPr>
-            <p:ph type="body" sz="quarter" idx="15"/>
-          </p:nvPr>
-        </p:nvSpPr>
-        <p:spPr/>
-        <p:txBody>
-          <a:bodyPr/>
+            <a:r>
+              <a:rPr lang="fr-FR" sz="2000" dirty="0" smtClean="0"/>
+              <a:t>Terminer la communication client-serveur</a:t>
+            </a:r>
+          </a:p>
+          <a:p>
+            <a:endParaRPr lang="fr-FR" sz="2000" dirty="0"/>
+          </a:p>
+          <a:p>
+            <a:r>
+              <a:rPr lang="fr-FR" sz="2000" dirty="0" err="1" smtClean="0"/>
+              <a:t>Debug</a:t>
+            </a:r>
+            <a:r>
+              <a:rPr lang="fr-FR" sz="2000" dirty="0" smtClean="0"/>
+              <a:t> des collisions</a:t>
+            </a:r>
+          </a:p>
+          <a:p>
+            <a:endParaRPr lang="fr-FR" sz="2000" dirty="0"/>
+          </a:p>
+          <a:p>
+            <a:r>
+              <a:rPr lang="fr-FR" sz="2000" dirty="0" smtClean="0"/>
+              <a:t>Implémentation des bonus restants</a:t>
+            </a:r>
+          </a:p>
+          <a:p>
+            <a:endParaRPr lang="fr-FR" sz="2000" dirty="0"/>
+          </a:p>
+          <a:p>
+            <a:r>
+              <a:rPr lang="fr-FR" sz="2000" dirty="0" smtClean="0"/>
+              <a:t>Choix du tank en début de partie</a:t>
+            </a:r>
+          </a:p>
+          <a:p>
+            <a:endParaRPr lang="fr-FR" sz="2000" dirty="0" smtClean="0"/>
+          </a:p>
+          <a:p>
+            <a:r>
+              <a:rPr lang="fr-FR" sz="2000" dirty="0" err="1" smtClean="0"/>
+              <a:t>Relancement</a:t>
+            </a:r>
+            <a:r>
+              <a:rPr lang="fr-FR" sz="2000" dirty="0" smtClean="0"/>
+              <a:t> de la partie</a:t>
+            </a:r>
+            <a:endParaRPr lang="fr-FR" sz="2000" dirty="0" smtClean="0"/>
+          </a:p>
+        </p:txBody>
+      </p:sp>
+      <p:sp>
+        <p:nvSpPr>
+          <p:cNvPr id="4" name="Espace réservé du texte 3"/>
+          <p:cNvSpPr>
+            <a:spLocks noGrp="1"/>
+          </p:cNvSpPr>
+          <p:nvPr>
+            <p:ph type="body" sz="quarter" idx="13"/>
+          </p:nvPr>
+        </p:nvSpPr>
+        <p:spPr>
+          <a:xfrm>
+            <a:off x="317420" y="114259"/>
+            <a:ext cx="5760000" cy="516874"/>
+          </a:xfrm>
+        </p:spPr>
+        <p:txBody>
+          <a:bodyPr anchor="ctr">
+            <a:noAutofit/>
+          </a:bodyPr>
           <a:lstStyle/>
           <a:p>
-            <a:endParaRPr lang="fr-FR"/>
+            <a:r>
+              <a:rPr lang="fr-FR" sz="2400" dirty="0" smtClean="0"/>
+              <a:t>Développement restant</a:t>
+            </a:r>
+            <a:endParaRPr lang="fr-FR" sz="2400" dirty="0"/>
           </a:p>
         </p:txBody>
       </p:sp>
     </p:spTree>
     <p:extLst>
       <p:ext uri="{BB962C8B-B14F-4D97-AF65-F5344CB8AC3E}">
-        <p14:creationId xmlns:p14="http://schemas.microsoft.com/office/powerpoint/2010/main" val="2647164006"/>
+        <p14:creationId xmlns:p14="http://schemas.microsoft.com/office/powerpoint/2010/main" val="2238866763"/>
       </p:ext>
     </p:extLst>
   </p:cSld>
   <p:clrMapOvr>
     <a:masterClrMapping/>
   </p:clrMapOvr>
+  <p:transition spd="slow">
+    <p:push dir="u"/>
+  </p:transition>
+  <p:timing>
+    <p:tnLst>
+      <p:par>
+        <p:cTn id="1" dur="indefinite" restart="never" nodeType="tmRoot"/>
+      </p:par>
+    </p:tnLst>
+  </p:timing>
+</p:sld>
+</file>
+
+<file path=ppt/slides/slide13.xml><?xml version="1.0" encoding="utf-8"?>
+<p:sld xmlns:a="http://schemas.openxmlformats.org/drawingml/2006/main" xmlns:r="http://schemas.openxmlformats.org/officeDocument/2006/relationships" xmlns:p="http://schemas.openxmlformats.org/presentationml/2006/main">
+  <p:cSld>
+    <p:spTree>
+      <p:nvGrpSpPr>
+        <p:cNvPr id="1" name=""/>
+        <p:cNvGrpSpPr/>
+        <p:nvPr/>
+      </p:nvGrpSpPr>
+      <p:grpSpPr>
+        <a:xfrm>
+          <a:off x="0" y="0"/>
+          <a:ext cx="0" cy="0"/>
+          <a:chOff x="0" y="0"/>
+          <a:chExt cx="0" cy="0"/>
+        </a:xfrm>
+      </p:grpSpPr>
+      <p:sp>
+        <p:nvSpPr>
+          <p:cNvPr id="2" name="Titre 1"/>
+          <p:cNvSpPr>
+            <a:spLocks noGrp="1"/>
+          </p:cNvSpPr>
+          <p:nvPr>
+            <p:ph type="title"/>
+          </p:nvPr>
+        </p:nvSpPr>
+        <p:spPr/>
+        <p:txBody>
+          <a:bodyPr/>
+          <a:lstStyle/>
+          <a:p>
+            <a:r>
+              <a:rPr lang="fr-FR" cap="small" dirty="0" smtClean="0"/>
+              <a:t>Démo du jeu</a:t>
+            </a:r>
+            <a:endParaRPr lang="fr-FR" cap="small" dirty="0"/>
+          </a:p>
+        </p:txBody>
+      </p:sp>
+    </p:spTree>
+    <p:extLst>
+      <p:ext uri="{BB962C8B-B14F-4D97-AF65-F5344CB8AC3E}">
+        <p14:creationId xmlns:p14="http://schemas.microsoft.com/office/powerpoint/2010/main" val="3581340210"/>
+      </p:ext>
+    </p:extLst>
+  </p:cSld>
+  <p:clrMapOvr>
+    <a:masterClrMapping/>
+  </p:clrMapOvr>
+  <p:transition spd="slow">
+    <p:push dir="u"/>
+  </p:transition>
   <p:timing>
     <p:tnLst>
       <p:par>
@@ -4488,28 +6071,91 @@
           <a:lstStyle/>
           <a:p>
             <a:r>
-              <a:rPr lang="fr-FR" dirty="0" smtClean="0"/>
-              <a:t>Jeu de bataille 2D en vue de dessus</a:t>
-            </a:r>
-          </a:p>
-          <a:p>
-            <a:r>
-              <a:rPr lang="fr-FR" dirty="0" smtClean="0"/>
-              <a:t>Chaque joueur commande un tank</a:t>
-            </a:r>
-          </a:p>
-          <a:p>
-            <a:r>
-              <a:rPr lang="fr-FR" dirty="0" smtClean="0"/>
-              <a:t>Le but du jeu est de détruire l’adversaire</a:t>
-            </a:r>
-            <a:endParaRPr lang="fr-FR" dirty="0"/>
-          </a:p>
-          <a:p>
-            <a:r>
-              <a:rPr lang="fr-FR" dirty="0" smtClean="0"/>
-              <a:t>De bonus sont disponibles sur la carte</a:t>
-            </a:r>
+              <a:rPr lang="fr-FR" sz="1600" dirty="0"/>
+              <a:t>Présentation du </a:t>
+            </a:r>
+            <a:r>
+              <a:rPr lang="fr-FR" sz="1600" dirty="0" smtClean="0"/>
+              <a:t>projet</a:t>
+            </a:r>
+          </a:p>
+          <a:p>
+            <a:r>
+              <a:rPr lang="fr-FR" sz="1600" dirty="0"/>
+              <a:t>Cas d’utilisation</a:t>
+            </a:r>
+          </a:p>
+          <a:p>
+            <a:r>
+              <a:rPr lang="fr-FR" sz="1600" dirty="0"/>
+              <a:t>Architecture générale</a:t>
+            </a:r>
+          </a:p>
+          <a:p>
+            <a:pPr lvl="1"/>
+            <a:r>
+              <a:rPr lang="fr-FR" sz="1000" dirty="0"/>
+              <a:t>Protocole de communication réseau</a:t>
+            </a:r>
+          </a:p>
+          <a:p>
+            <a:pPr lvl="1"/>
+            <a:r>
+              <a:rPr lang="fr-FR" sz="1000" dirty="0" smtClean="0"/>
+              <a:t>Diagramme </a:t>
+            </a:r>
+            <a:r>
+              <a:rPr lang="fr-FR" sz="1000" dirty="0"/>
+              <a:t>de séquence</a:t>
+            </a:r>
+          </a:p>
+          <a:p>
+            <a:pPr lvl="1"/>
+            <a:r>
+              <a:rPr lang="fr-FR" sz="1000" dirty="0"/>
+              <a:t>Base de données</a:t>
+            </a:r>
+          </a:p>
+          <a:p>
+            <a:r>
+              <a:rPr lang="fr-FR" sz="1600" dirty="0"/>
+              <a:t>Interface graphique du client</a:t>
+            </a:r>
+          </a:p>
+          <a:p>
+            <a:r>
+              <a:rPr lang="fr-FR" sz="1600" dirty="0"/>
+              <a:t>Fonctionnalités abandonnées</a:t>
+            </a:r>
+          </a:p>
+          <a:p>
+            <a:r>
+              <a:rPr lang="fr-FR" sz="1600" dirty="0"/>
+              <a:t>Difficultés rencontrées</a:t>
+            </a:r>
+          </a:p>
+          <a:p>
+            <a:r>
+              <a:rPr lang="fr-FR" sz="1600" dirty="0"/>
+              <a:t>Développement </a:t>
+            </a:r>
+            <a:r>
+              <a:rPr lang="fr-FR" sz="1600" dirty="0" smtClean="0"/>
+              <a:t>restant</a:t>
+            </a:r>
+          </a:p>
+          <a:p>
+            <a:r>
+              <a:rPr lang="fr-FR" sz="1600" dirty="0" smtClean="0"/>
+              <a:t>Démo du jeu</a:t>
+            </a:r>
+          </a:p>
+          <a:p>
+            <a:r>
+              <a:rPr lang="fr-FR" sz="1600" dirty="0" smtClean="0"/>
+              <a:t>Conclusion</a:t>
+            </a:r>
+            <a:endParaRPr lang="fr-FR" sz="1600" dirty="0"/>
           </a:p>
         </p:txBody>
       </p:sp>
@@ -4525,8 +6171,8 @@
         </p:nvSpPr>
         <p:spPr>
           <a:xfrm>
-            <a:off x="317421" y="114259"/>
-            <a:ext cx="3557405" cy="516874"/>
+            <a:off x="317420" y="114259"/>
+            <a:ext cx="5760000" cy="516874"/>
           </a:xfrm>
         </p:spPr>
         <p:txBody>
@@ -4537,7 +6183,7 @@
           <a:p>
             <a:r>
               <a:rPr lang="fr-FR" sz="2400" dirty="0" smtClean="0"/>
-              <a:t>Présentation du projet</a:t>
+              <a:t>Sommaire</a:t>
             </a:r>
             <a:endParaRPr lang="fr-FR" sz="2400" dirty="0"/>
           </a:p>
@@ -4546,13 +6192,16 @@
     </p:spTree>
     <p:extLst>
       <p:ext uri="{BB962C8B-B14F-4D97-AF65-F5344CB8AC3E}">
-        <p14:creationId xmlns:p14="http://schemas.microsoft.com/office/powerpoint/2010/main" val="469337646"/>
+        <p14:creationId xmlns:p14="http://schemas.microsoft.com/office/powerpoint/2010/main" val="2333937626"/>
       </p:ext>
     </p:extLst>
   </p:cSld>
   <p:clrMapOvr>
     <a:masterClrMapping/>
   </p:clrMapOvr>
+  <p:transition spd="slow">
+    <p:push dir="u"/>
+  </p:transition>
   <p:timing>
     <p:tnLst>
       <p:par>
@@ -4582,74 +6231,177 @@
       </p:grpSpPr>
       <p:sp>
         <p:nvSpPr>
-          <p:cNvPr id="4" name="Espace réservé du contenu 3"/>
-          <p:cNvSpPr>
-            <a:spLocks noGrp="1"/>
-          </p:cNvSpPr>
-          <p:nvPr>
-            <p:ph sz="half" idx="2"/>
+          <p:cNvPr id="3" name="Espace réservé du contenu 2"/>
+          <p:cNvSpPr>
+            <a:spLocks noGrp="1"/>
+          </p:cNvSpPr>
+          <p:nvPr>
+            <p:ph idx="1"/>
+          </p:nvPr>
+        </p:nvSpPr>
+        <p:spPr/>
+        <p:txBody>
+          <a:bodyPr/>
+          <a:lstStyle/>
+          <a:p>
+            <a:r>
+              <a:rPr lang="fr-FR" dirty="0" smtClean="0"/>
+              <a:t>Jeu de bataille 2D en vue de dessus</a:t>
+            </a:r>
+          </a:p>
+          <a:p>
+            <a:r>
+              <a:rPr lang="fr-FR" dirty="0" smtClean="0"/>
+              <a:t>Chaque joueur commande un tank</a:t>
+            </a:r>
+          </a:p>
+          <a:p>
+            <a:r>
+              <a:rPr lang="fr-FR" dirty="0" smtClean="0"/>
+              <a:t>Le but du jeu est de détruire l’adversaire</a:t>
+            </a:r>
+            <a:endParaRPr lang="fr-FR" dirty="0"/>
+          </a:p>
+          <a:p>
+            <a:r>
+              <a:rPr lang="fr-FR" dirty="0" smtClean="0"/>
+              <a:t>De bonus sont disponibles sur la carte</a:t>
+            </a:r>
+          </a:p>
+        </p:txBody>
+      </p:sp>
+      <p:sp>
+        <p:nvSpPr>
+          <p:cNvPr id="4" name="Espace réservé du texte 3"/>
+          <p:cNvSpPr>
+            <a:spLocks noGrp="1"/>
+          </p:cNvSpPr>
+          <p:nvPr>
+            <p:ph type="body" sz="quarter" idx="13"/>
           </p:nvPr>
         </p:nvSpPr>
         <p:spPr>
           <a:xfrm>
-            <a:off x="5136530" y="1694935"/>
-            <a:ext cx="3296822" cy="1072134"/>
+            <a:off x="317420" y="114259"/>
+            <a:ext cx="5760000" cy="516874"/>
           </a:xfrm>
         </p:spPr>
         <p:txBody>
-          <a:bodyPr/>
+          <a:bodyPr anchor="ctr">
+            <a:noAutofit/>
+          </a:bodyPr>
           <a:lstStyle/>
           <a:p>
-            <a:pPr>
-              <a:buFont typeface="Arial" panose="020B0604020202020204" pitchFamily="34" charset="0"/>
-              <a:buChar char="•"/>
-            </a:pPr>
-            <a:r>
-              <a:rPr lang="fr-FR" sz="2000" dirty="0" smtClean="0"/>
+            <a:r>
+              <a:rPr lang="fr-FR" sz="2400" dirty="0" smtClean="0"/>
+              <a:t>Présentation du projet</a:t>
+            </a:r>
+            <a:endParaRPr lang="fr-FR" sz="2400" dirty="0"/>
+          </a:p>
+        </p:txBody>
+      </p:sp>
+    </p:spTree>
+    <p:extLst>
+      <p:ext uri="{BB962C8B-B14F-4D97-AF65-F5344CB8AC3E}">
+        <p14:creationId xmlns:p14="http://schemas.microsoft.com/office/powerpoint/2010/main" val="469337646"/>
+      </p:ext>
+    </p:extLst>
+  </p:cSld>
+  <p:clrMapOvr>
+    <a:masterClrMapping/>
+  </p:clrMapOvr>
+  <p:transition spd="slow">
+    <p:push dir="u"/>
+  </p:transition>
+  <p:timing>
+    <p:tnLst>
+      <p:par>
+        <p:cTn id="1" dur="indefinite" restart="never" nodeType="tmRoot"/>
+      </p:par>
+    </p:tnLst>
+  </p:timing>
+</p:sld>
+</file>
+
+<file path=ppt/slides/slide4.xml><?xml version="1.0" encoding="utf-8"?>
+<p:sld xmlns:a="http://schemas.openxmlformats.org/drawingml/2006/main" xmlns:r="http://schemas.openxmlformats.org/officeDocument/2006/relationships" xmlns:p="http://schemas.openxmlformats.org/presentationml/2006/main">
+  <p:cSld>
+    <p:spTree>
+      <p:nvGrpSpPr>
+        <p:cNvPr id="1" name=""/>
+        <p:cNvGrpSpPr/>
+        <p:nvPr/>
+      </p:nvGrpSpPr>
+      <p:grpSpPr>
+        <a:xfrm>
+          <a:off x="0" y="0"/>
+          <a:ext cx="0" cy="0"/>
+          <a:chOff x="0" y="0"/>
+          <a:chExt cx="0" cy="0"/>
+        </a:xfrm>
+      </p:grpSpPr>
+      <p:sp>
+        <p:nvSpPr>
+          <p:cNvPr id="6" name="Espace réservé du texte 5"/>
+          <p:cNvSpPr>
+            <a:spLocks noGrp="1"/>
+          </p:cNvSpPr>
+          <p:nvPr>
+            <p:ph type="body" sz="quarter" idx="15"/>
+          </p:nvPr>
+        </p:nvSpPr>
+        <p:spPr>
+          <a:xfrm>
+            <a:off x="4569646" y="1105372"/>
+            <a:ext cx="3600000" cy="1661697"/>
+          </a:xfrm>
+        </p:spPr>
+        <p:txBody>
+          <a:bodyPr>
+            <a:normAutofit/>
+          </a:bodyPr>
+          <a:lstStyle/>
+          <a:p>
+            <a:r>
+              <a:rPr lang="fr-FR" dirty="0" smtClean="0"/>
+              <a:t>Le </a:t>
+            </a:r>
+            <a:r>
+              <a:rPr lang="fr-FR" dirty="0" smtClean="0"/>
+              <a:t>joueur :</a:t>
+            </a:r>
+          </a:p>
+          <a:p>
+            <a:pPr lvl="1"/>
+            <a:r>
+              <a:rPr lang="fr-FR" dirty="0" smtClean="0"/>
               <a:t>Jouer</a:t>
             </a:r>
-            <a:endParaRPr lang="fr-FR" dirty="0" smtClean="0"/>
-          </a:p>
-          <a:p>
-            <a:pPr lvl="1">
-              <a:buFont typeface="Arial" panose="020B0604020202020204" pitchFamily="34" charset="0"/>
-              <a:buChar char="•"/>
-            </a:pPr>
-            <a:r>
-              <a:rPr lang="fr-FR" sz="1800" dirty="0" smtClean="0"/>
-              <a:t>Rejoindre une partie</a:t>
-            </a:r>
-          </a:p>
-          <a:p>
-            <a:pPr lvl="1">
-              <a:buFont typeface="Arial" panose="020B0604020202020204" pitchFamily="34" charset="0"/>
-              <a:buChar char="•"/>
-            </a:pPr>
-            <a:r>
-              <a:rPr lang="fr-FR" sz="1800" dirty="0" smtClean="0"/>
-              <a:t>Voir les scores</a:t>
-            </a:r>
-          </a:p>
-        </p:txBody>
-      </p:sp>
-      <p:sp>
-        <p:nvSpPr>
-          <p:cNvPr id="6" name="Espace réservé du texte 5"/>
-          <p:cNvSpPr>
-            <a:spLocks noGrp="1"/>
-          </p:cNvSpPr>
-          <p:nvPr>
-            <p:ph type="body" sz="quarter" idx="15"/>
-          </p:nvPr>
-        </p:nvSpPr>
-        <p:spPr/>
-        <p:txBody>
-          <a:bodyPr/>
-          <a:lstStyle/>
-          <a:p>
+          </a:p>
+          <a:p>
+            <a:pPr lvl="2"/>
             <a:r>
               <a:rPr lang="fr-FR" dirty="0" smtClean="0"/>
-              <a:t>Le joueur</a:t>
+              <a:t>Rejoindre </a:t>
+            </a:r>
+            <a:r>
+              <a:rPr lang="fr-FR" dirty="0"/>
+              <a:t>une </a:t>
+            </a:r>
+            <a:r>
+              <a:rPr lang="fr-FR" dirty="0" smtClean="0"/>
+              <a:t>partie</a:t>
+            </a:r>
+          </a:p>
+          <a:p>
+            <a:pPr lvl="2"/>
+            <a:r>
+              <a:rPr lang="fr-FR" dirty="0"/>
+              <a:t>Voir les </a:t>
+            </a:r>
+            <a:r>
+              <a:rPr lang="fr-FR" dirty="0" smtClean="0"/>
+              <a:t>scores</a:t>
             </a:r>
             <a:endParaRPr lang="fr-FR" dirty="0"/>
           </a:p>
@@ -4718,139 +6470,52 @@
           </a:p>
         </p:txBody>
       </p:sp>
-      <p:grpSp>
-        <p:nvGrpSpPr>
-          <p:cNvPr id="17" name="Groupe 16"/>
-          <p:cNvGrpSpPr/>
+      <p:sp>
+        <p:nvSpPr>
+          <p:cNvPr id="16" name="Rectangle 15"/>
+          <p:cNvSpPr/>
           <p:nvPr/>
-        </p:nvGrpSpPr>
-        <p:grpSpPr>
+        </p:nvSpPr>
+        <p:spPr>
           <a:xfrm>
             <a:off x="164806" y="999461"/>
             <a:ext cx="4320000" cy="3240000"/>
-            <a:chOff x="164806" y="999461"/>
-            <a:chExt cx="4320000" cy="3240000"/>
           </a:xfrm>
-        </p:grpSpPr>
-        <p:sp>
-          <p:nvSpPr>
-            <p:cNvPr id="16" name="Rectangle 15"/>
-            <p:cNvSpPr/>
-            <p:nvPr/>
-          </p:nvSpPr>
-          <p:spPr>
-            <a:xfrm>
-              <a:off x="164806" y="999461"/>
-              <a:ext cx="4320000" cy="3240000"/>
-            </a:xfrm>
-            <a:prstGeom prst="rect">
-              <a:avLst/>
-            </a:prstGeom>
+          <a:prstGeom prst="rect">
+            <a:avLst/>
+          </a:prstGeom>
+          <a:solidFill>
+            <a:schemeClr val="bg1"/>
+          </a:solidFill>
+          <a:ln>
             <a:solidFill>
-              <a:schemeClr val="bg1"/>
+              <a:schemeClr val="tx1"/>
             </a:solidFill>
-            <a:ln>
-              <a:solidFill>
-                <a:schemeClr val="tx1"/>
-              </a:solidFill>
-            </a:ln>
-          </p:spPr>
-          <p:style>
-            <a:lnRef idx="1">
-              <a:schemeClr val="accent1"/>
-            </a:lnRef>
-            <a:fillRef idx="3">
-              <a:schemeClr val="accent1"/>
-            </a:fillRef>
-            <a:effectRef idx="2">
-              <a:schemeClr val="accent1"/>
-            </a:effectRef>
-            <a:fontRef idx="minor">
-              <a:schemeClr val="lt1"/>
-            </a:fontRef>
-          </p:style>
-          <p:txBody>
-            <a:bodyPr rtlCol="0" anchor="ctr"/>
-            <a:lstStyle/>
-            <a:p>
-              <a:pPr algn="ctr"/>
-              <a:endParaRPr lang="fr-CH"/>
-            </a:p>
-          </p:txBody>
-        </p:sp>
-        <p:graphicFrame>
-          <p:nvGraphicFramePr>
-            <p:cNvPr id="11" name="Objet 10"/>
-            <p:cNvGraphicFramePr>
-              <a:graphicFrameLocks noChangeAspect="1"/>
-            </p:cNvGraphicFramePr>
-            <p:nvPr>
-              <p:extLst>
-                <p:ext uri="{D42A27DB-BD31-4B8C-83A1-F6EECF244321}">
-                  <p14:modId xmlns:p14="http://schemas.microsoft.com/office/powerpoint/2010/main" val="2740998838"/>
-                </p:ext>
-              </p:extLst>
-            </p:nvPr>
-          </p:nvGraphicFramePr>
-          <p:xfrm>
-            <a:off x="317421" y="1105372"/>
-            <a:ext cx="4021026" cy="3024000"/>
-          </p:xfrm>
-          <a:graphic>
-            <a:graphicData uri="http://schemas.openxmlformats.org/presentationml/2006/ole">
-              <mc:AlternateContent xmlns:mc="http://schemas.openxmlformats.org/markup-compatibility/2006">
-                <mc:Choice xmlns:v="urn:schemas-microsoft-com:vml" Requires="v">
-                  <p:oleObj spid="_x0000_s2058" name="Visio" r:id="rId3" imgW="5429393" imgH="4083212" progId="Visio.Drawing.15">
-                    <p:embed/>
-                  </p:oleObj>
-                </mc:Choice>
-                <mc:Fallback>
-                  <p:oleObj name="Visio" r:id="rId3" imgW="5429393" imgH="4083212" progId="Visio.Drawing.15">
-                    <p:embed/>
-                    <p:pic>
-                      <p:nvPicPr>
-                        <p:cNvPr id="0" name="Object 3"/>
-                        <p:cNvPicPr>
-                          <a:picLocks noChangeAspect="1" noChangeArrowheads="1"/>
-                        </p:cNvPicPr>
-                        <p:nvPr/>
-                      </p:nvPicPr>
-                      <p:blipFill>
-                        <a:blip r:embed="rId4">
-                          <a:extLst>
-                            <a:ext uri="{28A0092B-C50C-407E-A947-70E740481C1C}">
-                              <a14:useLocalDpi xmlns:a14="http://schemas.microsoft.com/office/drawing/2010/main" val="0"/>
-                            </a:ext>
-                          </a:extLst>
-                        </a:blip>
-                        <a:srcRect/>
-                        <a:stretch>
-                          <a:fillRect/>
-                        </a:stretch>
-                      </p:blipFill>
-                      <p:spPr bwMode="auto">
-                        <a:xfrm>
-                          <a:off x="317421" y="1105372"/>
-                          <a:ext cx="4021026" cy="3024000"/>
-                        </a:xfrm>
-                        <a:prstGeom prst="rect">
-                          <a:avLst/>
-                        </a:prstGeom>
-                        <a:solidFill>
-                          <a:schemeClr val="bg1"/>
-                        </a:solidFill>
-                        <a:ln>
-                          <a:noFill/>
-                        </a:ln>
-                      </p:spPr>
-                    </p:pic>
-                  </p:oleObj>
-                </mc:Fallback>
-              </mc:AlternateContent>
-            </a:graphicData>
-          </a:graphic>
-        </p:graphicFrame>
-      </p:grpSp>
+          </a:ln>
+        </p:spPr>
+        <p:style>
+          <a:lnRef idx="1">
+            <a:schemeClr val="accent1"/>
+          </a:lnRef>
+          <a:fillRef idx="3">
+            <a:schemeClr val="accent1"/>
+          </a:fillRef>
+          <a:effectRef idx="2">
+            <a:schemeClr val="accent1"/>
+          </a:effectRef>
+          <a:fontRef idx="minor">
+            <a:schemeClr val="lt1"/>
+          </a:fontRef>
+        </p:style>
+        <p:txBody>
+          <a:bodyPr rtlCol="0" anchor="ctr"/>
+          <a:lstStyle/>
+          <a:p>
+            <a:pPr algn="ctr"/>
+            <a:endParaRPr lang="fr-CH"/>
+          </a:p>
+        </p:txBody>
+      </p:sp>
       <p:sp>
         <p:nvSpPr>
           <p:cNvPr id="13" name="Espace réservé du texte 3"/>
@@ -4863,8 +6528,8 @@
         </p:nvSpPr>
         <p:spPr>
           <a:xfrm>
-            <a:off x="317421" y="114259"/>
-            <a:ext cx="3557405" cy="516874"/>
+            <a:off x="317420" y="114259"/>
+            <a:ext cx="5760000" cy="516874"/>
           </a:xfrm>
         </p:spPr>
         <p:txBody>
@@ -4883,58 +6548,6 @@
       </p:sp>
       <p:sp>
         <p:nvSpPr>
-          <p:cNvPr id="14" name="Espace réservé du contenu 3"/>
-          <p:cNvSpPr>
-            <a:spLocks noGrp="1"/>
-          </p:cNvSpPr>
-          <p:nvPr>
-            <p:ph sz="half" idx="2"/>
-          </p:nvPr>
-        </p:nvSpPr>
-        <p:spPr>
-          <a:xfrm>
-            <a:off x="5136530" y="3356632"/>
-            <a:ext cx="3296822" cy="1072134"/>
-          </a:xfrm>
-        </p:spPr>
-        <p:txBody>
-          <a:bodyPr/>
-          <a:lstStyle/>
-          <a:p>
-            <a:pPr>
-              <a:buFont typeface="Arial" panose="020B0604020202020204" pitchFamily="34" charset="0"/>
-              <a:buChar char="•"/>
-            </a:pPr>
-            <a:r>
-              <a:rPr lang="fr-FR" sz="2000" dirty="0" smtClean="0"/>
-              <a:t>Créer une partie</a:t>
-            </a:r>
-            <a:endParaRPr lang="fr-FR" dirty="0" smtClean="0"/>
-          </a:p>
-          <a:p>
-            <a:pPr lvl="1">
-              <a:buFont typeface="Arial" panose="020B0604020202020204" pitchFamily="34" charset="0"/>
-              <a:buChar char="•"/>
-            </a:pPr>
-            <a:r>
-              <a:rPr lang="fr-FR" sz="1800" dirty="0" smtClean="0"/>
-              <a:t>Configurer la partie</a:t>
-            </a:r>
-          </a:p>
-          <a:p>
-            <a:pPr lvl="1">
-              <a:buFont typeface="Arial" panose="020B0604020202020204" pitchFamily="34" charset="0"/>
-              <a:buChar char="•"/>
-            </a:pPr>
-            <a:r>
-              <a:rPr lang="fr-FR" sz="1800" dirty="0" smtClean="0"/>
-              <a:t>Démarrer la partie</a:t>
-            </a:r>
-          </a:p>
-        </p:txBody>
-      </p:sp>
-      <p:sp>
-        <p:nvSpPr>
           <p:cNvPr id="15" name="Espace réservé du texte 5"/>
           <p:cNvSpPr>
             <a:spLocks noGrp="1"/>
@@ -4946,21 +6559,87 @@
         <p:spPr>
           <a:xfrm>
             <a:off x="4569646" y="2767069"/>
-            <a:ext cx="3124904" cy="589563"/>
+            <a:ext cx="3600000" cy="1663200"/>
           </a:xfrm>
         </p:spPr>
         <p:txBody>
-          <a:bodyPr/>
+          <a:bodyPr>
+            <a:normAutofit/>
+          </a:bodyPr>
           <a:lstStyle/>
           <a:p>
             <a:r>
               <a:rPr lang="fr-FR" dirty="0" smtClean="0"/>
-              <a:t>L’admin</a:t>
-            </a:r>
-            <a:endParaRPr lang="fr-FR" dirty="0"/>
-          </a:p>
-        </p:txBody>
-      </p:sp>
+              <a:t>L’admin :</a:t>
+            </a:r>
+          </a:p>
+          <a:p>
+            <a:pPr lvl="1"/>
+            <a:r>
+              <a:rPr lang="fr-FR" dirty="0" smtClean="0"/>
+              <a:t>Créer </a:t>
+            </a:r>
+            <a:r>
+              <a:rPr lang="fr-FR" dirty="0"/>
+              <a:t>une </a:t>
+            </a:r>
+            <a:r>
+              <a:rPr lang="fr-FR" dirty="0" smtClean="0"/>
+              <a:t>partie</a:t>
+            </a:r>
+          </a:p>
+          <a:p>
+            <a:pPr lvl="2"/>
+            <a:r>
+              <a:rPr lang="fr-FR" dirty="0" smtClean="0"/>
+              <a:t>Configurer </a:t>
+            </a:r>
+            <a:r>
+              <a:rPr lang="fr-FR" dirty="0"/>
+              <a:t>la </a:t>
+            </a:r>
+            <a:r>
+              <a:rPr lang="fr-FR" dirty="0" smtClean="0"/>
+              <a:t>partie</a:t>
+            </a:r>
+          </a:p>
+          <a:p>
+            <a:pPr lvl="2"/>
+            <a:r>
+              <a:rPr lang="fr-FR" dirty="0" smtClean="0"/>
+              <a:t>Démarrer </a:t>
+            </a:r>
+            <a:r>
+              <a:rPr lang="fr-FR" dirty="0"/>
+              <a:t>la partie</a:t>
+            </a:r>
+          </a:p>
+        </p:txBody>
+      </p:sp>
+      <p:pic>
+        <p:nvPicPr>
+          <p:cNvPr id="5" name="Image 4"/>
+          <p:cNvPicPr>
+            <a:picLocks noChangeAspect="1"/>
+          </p:cNvPicPr>
+          <p:nvPr/>
+        </p:nvPicPr>
+        <p:blipFill>
+          <a:blip r:embed="rId3"/>
+          <a:stretch>
+            <a:fillRect/>
+          </a:stretch>
+        </p:blipFill>
+        <p:spPr>
+          <a:xfrm>
+            <a:off x="317419" y="1107512"/>
+            <a:ext cx="3999291" cy="3012235"/>
+          </a:xfrm>
+          <a:prstGeom prst="rect">
+            <a:avLst/>
+          </a:prstGeom>
+        </p:spPr>
+      </p:pic>
     </p:spTree>
     <p:extLst>
       <p:ext uri="{BB962C8B-B14F-4D97-AF65-F5344CB8AC3E}">
@@ -4971,126 +6650,9 @@
   <p:clrMapOvr>
     <a:masterClrMapping/>
   </p:clrMapOvr>
-  <p:timing>
-    <p:tnLst>
-      <p:par>
-        <p:cTn id="1" dur="indefinite" restart="never" nodeType="tmRoot"/>
-      </p:par>
-    </p:tnLst>
-  </p:timing>
-</p:sld>
-</file>
-
-<file path=ppt/slides/slide4.xml><?xml version="1.0" encoding="utf-8"?>
-<p:sld xmlns:a="http://schemas.openxmlformats.org/drawingml/2006/main" xmlns:r="http://schemas.openxmlformats.org/officeDocument/2006/relationships" xmlns:p="http://schemas.openxmlformats.org/presentationml/2006/main">
-  <p:cSld>
-    <p:spTree>
-      <p:nvGrpSpPr>
-        <p:cNvPr id="1" name=""/>
-        <p:cNvGrpSpPr/>
-        <p:nvPr/>
-      </p:nvGrpSpPr>
-      <p:grpSpPr>
-        <a:xfrm>
-          <a:off x="0" y="0"/>
-          <a:ext cx="0" cy="0"/>
-          <a:chOff x="0" y="0"/>
-          <a:chExt cx="0" cy="0"/>
-        </a:xfrm>
-      </p:grpSpPr>
-      <p:sp>
-        <p:nvSpPr>
-          <p:cNvPr id="3" name="Espace réservé du contenu 2"/>
-          <p:cNvSpPr>
-            <a:spLocks noGrp="1"/>
-          </p:cNvSpPr>
-          <p:nvPr>
-            <p:ph idx="1"/>
-          </p:nvPr>
-        </p:nvSpPr>
-        <p:spPr/>
-        <p:txBody>
-          <a:bodyPr/>
-          <a:lstStyle/>
-          <a:p>
-            <a:r>
-              <a:rPr lang="fr-FR" dirty="0" smtClean="0"/>
-              <a:t>Architecture client-serveur</a:t>
-            </a:r>
-          </a:p>
-          <a:p>
-            <a:r>
-              <a:rPr lang="fr-FR" dirty="0" smtClean="0"/>
-              <a:t>2 clients nécessaires pour une partie</a:t>
-            </a:r>
-            <a:endParaRPr lang="fr-FR" dirty="0"/>
-          </a:p>
-        </p:txBody>
-      </p:sp>
-      <p:sp>
-        <p:nvSpPr>
-          <p:cNvPr id="4" name="Espace réservé du texte 3"/>
-          <p:cNvSpPr>
-            <a:spLocks noGrp="1"/>
-          </p:cNvSpPr>
-          <p:nvPr>
-            <p:ph type="body" sz="quarter" idx="13"/>
-          </p:nvPr>
-        </p:nvSpPr>
-        <p:spPr>
-          <a:xfrm>
-            <a:off x="317421" y="114259"/>
-            <a:ext cx="3557405" cy="516874"/>
-          </a:xfrm>
-        </p:spPr>
-        <p:txBody>
-          <a:bodyPr anchor="ctr">
-            <a:noAutofit/>
-          </a:bodyPr>
-          <a:lstStyle/>
-          <a:p>
-            <a:r>
-              <a:rPr lang="fr-FR" sz="2400" dirty="0" smtClean="0"/>
-              <a:t>Architecture générale</a:t>
-            </a:r>
-            <a:endParaRPr lang="fr-FR" sz="2400" dirty="0"/>
-          </a:p>
-        </p:txBody>
-      </p:sp>
-      <p:pic>
-        <p:nvPicPr>
-          <p:cNvPr id="8" name="Image 7"/>
-          <p:cNvPicPr>
-            <a:picLocks noChangeAspect="1"/>
-          </p:cNvPicPr>
-          <p:nvPr/>
-        </p:nvPicPr>
-        <p:blipFill>
-          <a:blip r:embed="rId2"/>
-          <a:stretch>
-            <a:fillRect/>
-          </a:stretch>
-        </p:blipFill>
-        <p:spPr>
-          <a:xfrm>
-            <a:off x="1852182" y="2160000"/>
-            <a:ext cx="5439637" cy="2870175"/>
-          </a:xfrm>
-          <a:prstGeom prst="rect">
-            <a:avLst/>
-          </a:prstGeom>
-        </p:spPr>
-      </p:pic>
-    </p:spTree>
-    <p:extLst>
-      <p:ext uri="{BB962C8B-B14F-4D97-AF65-F5344CB8AC3E}">
-        <p14:creationId xmlns:p14="http://schemas.microsoft.com/office/powerpoint/2010/main" val="285527331"/>
-      </p:ext>
-    </p:extLst>
-  </p:cSld>
-  <p:clrMapOvr>
-    <a:masterClrMapping/>
-  </p:clrMapOvr>
+  <p:transition spd="slow">
+    <p:push dir="u"/>
+  </p:transition>
   <p:timing>
     <p:tnLst>
       <p:par>
@@ -5120,51 +6682,260 @@
       </p:grpSpPr>
       <p:sp>
         <p:nvSpPr>
-          <p:cNvPr id="4" name="Espace réservé du contenu 3"/>
-          <p:cNvSpPr>
-            <a:spLocks noGrp="1"/>
-          </p:cNvSpPr>
-          <p:nvPr>
-            <p:ph sz="half" idx="2"/>
+          <p:cNvPr id="3" name="Espace réservé du contenu 2"/>
+          <p:cNvSpPr>
+            <a:spLocks noGrp="1"/>
+          </p:cNvSpPr>
+          <p:nvPr>
+            <p:ph idx="1"/>
+          </p:nvPr>
+        </p:nvSpPr>
+        <p:spPr/>
+        <p:txBody>
+          <a:bodyPr/>
+          <a:lstStyle/>
+          <a:p>
+            <a:r>
+              <a:rPr lang="fr-FR" dirty="0" smtClean="0"/>
+              <a:t>Architecture client-serveur</a:t>
+            </a:r>
+          </a:p>
+          <a:p>
+            <a:r>
+              <a:rPr lang="fr-FR" dirty="0" smtClean="0"/>
+              <a:t>2 clients nécessaires pour une partie</a:t>
+            </a:r>
+            <a:endParaRPr lang="fr-FR" dirty="0"/>
+          </a:p>
+        </p:txBody>
+      </p:sp>
+      <p:sp>
+        <p:nvSpPr>
+          <p:cNvPr id="4" name="Espace réservé du texte 3"/>
+          <p:cNvSpPr>
+            <a:spLocks noGrp="1"/>
+          </p:cNvSpPr>
+          <p:nvPr>
+            <p:ph type="body" sz="quarter" idx="13"/>
           </p:nvPr>
         </p:nvSpPr>
         <p:spPr>
           <a:xfrm>
-            <a:off x="5136530" y="1694935"/>
-            <a:ext cx="3296822" cy="1072134"/>
+            <a:off x="317420" y="114259"/>
+            <a:ext cx="5760000" cy="516874"/>
           </a:xfrm>
         </p:spPr>
         <p:txBody>
+          <a:bodyPr anchor="ctr">
+            <a:noAutofit/>
+          </a:bodyPr>
+          <a:lstStyle/>
+          <a:p>
+            <a:r>
+              <a:rPr lang="fr-FR" sz="2400" dirty="0" smtClean="0"/>
+              <a:t>Architecture générale</a:t>
+            </a:r>
+            <a:endParaRPr lang="fr-FR" sz="2400" dirty="0"/>
+          </a:p>
+        </p:txBody>
+      </p:sp>
+      <p:pic>
+        <p:nvPicPr>
+          <p:cNvPr id="8" name="Image 7"/>
+          <p:cNvPicPr>
+            <a:picLocks noChangeAspect="1"/>
+          </p:cNvPicPr>
+          <p:nvPr/>
+        </p:nvPicPr>
+        <p:blipFill>
+          <a:blip r:embed="rId3"/>
+          <a:stretch>
+            <a:fillRect/>
+          </a:stretch>
+        </p:blipFill>
+        <p:spPr>
+          <a:xfrm>
+            <a:off x="1852182" y="2160000"/>
+            <a:ext cx="5439637" cy="2870175"/>
+          </a:xfrm>
+          <a:prstGeom prst="rect">
+            <a:avLst/>
+          </a:prstGeom>
+        </p:spPr>
+      </p:pic>
+    </p:spTree>
+    <p:extLst>
+      <p:ext uri="{BB962C8B-B14F-4D97-AF65-F5344CB8AC3E}">
+        <p14:creationId xmlns:p14="http://schemas.microsoft.com/office/powerpoint/2010/main" val="285527331"/>
+      </p:ext>
+    </p:extLst>
+  </p:cSld>
+  <p:clrMapOvr>
+    <a:masterClrMapping/>
+  </p:clrMapOvr>
+  <p:transition spd="slow">
+    <p:push dir="u"/>
+  </p:transition>
+  <p:timing>
+    <p:tnLst>
+      <p:par>
+        <p:cTn id="1" dur="indefinite" restart="never" nodeType="tmRoot"/>
+      </p:par>
+    </p:tnLst>
+  </p:timing>
+</p:sld>
+</file>
+
+<file path=ppt/slides/slide6.xml><?xml version="1.0" encoding="utf-8"?>
+<p:sld xmlns:a="http://schemas.openxmlformats.org/drawingml/2006/main" xmlns:r="http://schemas.openxmlformats.org/officeDocument/2006/relationships" xmlns:p="http://schemas.openxmlformats.org/presentationml/2006/main">
+  <p:cSld>
+    <p:spTree>
+      <p:nvGrpSpPr>
+        <p:cNvPr id="1" name=""/>
+        <p:cNvGrpSpPr/>
+        <p:nvPr/>
+      </p:nvGrpSpPr>
+      <p:grpSpPr>
+        <a:xfrm>
+          <a:off x="0" y="0"/>
+          <a:ext cx="0" cy="0"/>
+          <a:chOff x="0" y="0"/>
+          <a:chExt cx="0" cy="0"/>
+        </a:xfrm>
+      </p:grpSpPr>
+      <p:sp>
+        <p:nvSpPr>
+          <p:cNvPr id="3" name="Espace réservé du contenu 2"/>
+          <p:cNvSpPr>
+            <a:spLocks noGrp="1"/>
+          </p:cNvSpPr>
+          <p:nvPr>
+            <p:ph idx="1"/>
+          </p:nvPr>
+        </p:nvSpPr>
+        <p:spPr/>
+        <p:txBody>
           <a:bodyPr/>
           <a:lstStyle/>
           <a:p>
-            <a:pPr>
-              <a:buFont typeface="Arial" panose="020B0604020202020204" pitchFamily="34" charset="0"/>
-              <a:buChar char="•"/>
-            </a:pPr>
-            <a:endParaRPr lang="fr-FR" sz="1800" dirty="0" smtClean="0"/>
-          </a:p>
-        </p:txBody>
-      </p:sp>
-      <p:sp>
-        <p:nvSpPr>
-          <p:cNvPr id="6" name="Espace réservé du texte 5"/>
-          <p:cNvSpPr>
-            <a:spLocks noGrp="1"/>
-          </p:cNvSpPr>
-          <p:nvPr>
-            <p:ph type="body" sz="quarter" idx="15"/>
-          </p:nvPr>
-        </p:nvSpPr>
-        <p:spPr/>
-        <p:txBody>
-          <a:bodyPr/>
+            <a:r>
+              <a:rPr lang="fr-FR" dirty="0" smtClean="0"/>
+              <a:t>Initialisation :</a:t>
+            </a:r>
+          </a:p>
+          <a:p>
+            <a:pPr lvl="1"/>
+            <a:r>
+              <a:rPr lang="fr-FR" dirty="0" smtClean="0"/>
+              <a:t>Sérialisation de classes pour l’initialisation des clients.</a:t>
+            </a:r>
+          </a:p>
+          <a:p>
+            <a:r>
+              <a:rPr lang="fr-FR" dirty="0" smtClean="0"/>
+              <a:t>En cours de partie :</a:t>
+            </a:r>
+          </a:p>
+          <a:p>
+            <a:pPr lvl="1"/>
+            <a:r>
+              <a:rPr lang="fr-FR" dirty="0" smtClean="0"/>
+              <a:t>2 classes sérialisables</a:t>
+            </a:r>
+          </a:p>
+          <a:p>
+            <a:pPr lvl="2"/>
+            <a:r>
+              <a:rPr lang="fr-FR" dirty="0" smtClean="0"/>
+              <a:t>Une pour le serveur pour envoyer les mises à jours du jeu aux clients.</a:t>
+            </a:r>
+          </a:p>
+          <a:p>
+            <a:pPr lvl="2"/>
+            <a:r>
+              <a:rPr lang="fr-FR" dirty="0" smtClean="0"/>
+              <a:t>Une pour le client pour envoyer les commandes au serveur.</a:t>
+            </a:r>
+          </a:p>
+          <a:p>
+            <a:pPr lvl="3"/>
+            <a:r>
+              <a:rPr lang="fr-FR" dirty="0" smtClean="0"/>
+              <a:t>Utilisation de classes héritées pour spécifier la commande envoyée (déplacement, tir, utilisation d’un bonus, etc.).</a:t>
+            </a:r>
+          </a:p>
+        </p:txBody>
+      </p:sp>
+      <p:sp>
+        <p:nvSpPr>
+          <p:cNvPr id="4" name="Espace réservé du texte 3"/>
+          <p:cNvSpPr>
+            <a:spLocks noGrp="1"/>
+          </p:cNvSpPr>
+          <p:nvPr>
+            <p:ph type="body" sz="quarter" idx="13"/>
+          </p:nvPr>
+        </p:nvSpPr>
+        <p:spPr>
+          <a:xfrm>
+            <a:off x="317420" y="114259"/>
+            <a:ext cx="5760000" cy="516874"/>
+          </a:xfrm>
+        </p:spPr>
+        <p:txBody>
+          <a:bodyPr anchor="ctr">
+            <a:noAutofit/>
+          </a:bodyPr>
           <a:lstStyle/>
           <a:p>
-            <a:endParaRPr lang="fr-FR" dirty="0"/>
-          </a:p>
-        </p:txBody>
-      </p:sp>
+            <a:r>
+              <a:rPr lang="fr-FR" sz="2400" dirty="0" smtClean="0"/>
+              <a:t>Protocole de communication réseau</a:t>
+            </a:r>
+            <a:endParaRPr lang="fr-FR" sz="2400" dirty="0"/>
+          </a:p>
+        </p:txBody>
+      </p:sp>
+    </p:spTree>
+    <p:extLst>
+      <p:ext uri="{BB962C8B-B14F-4D97-AF65-F5344CB8AC3E}">
+        <p14:creationId xmlns:p14="http://schemas.microsoft.com/office/powerpoint/2010/main" val="3413890685"/>
+      </p:ext>
+    </p:extLst>
+  </p:cSld>
+  <p:clrMapOvr>
+    <a:masterClrMapping/>
+  </p:clrMapOvr>
+  <p:transition spd="slow">
+    <p:push dir="u"/>
+  </p:transition>
+  <p:timing>
+    <p:tnLst>
+      <p:par>
+        <p:cTn id="1" dur="indefinite" restart="never" nodeType="tmRoot"/>
+      </p:par>
+    </p:tnLst>
+  </p:timing>
+</p:sld>
+</file>
+
+<file path=ppt/slides/slide7.xml><?xml version="1.0" encoding="utf-8"?>
+<p:sld xmlns:a="http://schemas.openxmlformats.org/drawingml/2006/main" xmlns:r="http://schemas.openxmlformats.org/officeDocument/2006/relationships" xmlns:p="http://schemas.openxmlformats.org/presentationml/2006/main">
+  <p:cSld>
+    <p:spTree>
+      <p:nvGrpSpPr>
+        <p:cNvPr id="1" name=""/>
+        <p:cNvGrpSpPr/>
+        <p:nvPr/>
+      </p:nvGrpSpPr>
+      <p:grpSpPr>
+        <a:xfrm>
+          <a:off x="0" y="0"/>
+          <a:ext cx="0" cy="0"/>
+          <a:chOff x="0" y="0"/>
+          <a:chExt cx="0" cy="0"/>
+        </a:xfrm>
+      </p:grpSpPr>
       <p:sp>
         <p:nvSpPr>
           <p:cNvPr id="10" name="Rectangle 4"/>
@@ -5228,21 +6999,91 @@
           </a:p>
         </p:txBody>
       </p:sp>
-      <p:sp>
-        <p:nvSpPr>
-          <p:cNvPr id="13" name="Espace réservé du texte 3"/>
-          <p:cNvSpPr>
-            <a:spLocks noGrp="1"/>
-          </p:cNvSpPr>
-          <p:nvPr>
-            <p:ph type="body" sz="quarter" idx="13"/>
+      <p:graphicFrame>
+        <p:nvGraphicFramePr>
+          <p:cNvPr id="11" name="Objet 10"/>
+          <p:cNvGraphicFramePr>
+            <a:graphicFrameLocks noChangeAspect="1"/>
+          </p:cNvGraphicFramePr>
+          <p:nvPr>
+            <p:extLst>
+              <p:ext uri="{D42A27DB-BD31-4B8C-83A1-F6EECF244321}">
+                <p14:modId xmlns:p14="http://schemas.microsoft.com/office/powerpoint/2010/main" val="722336523"/>
+              </p:ext>
+            </p:extLst>
+          </p:nvPr>
+        </p:nvGraphicFramePr>
+        <p:xfrm>
+          <a:off x="2239824" y="747301"/>
+          <a:ext cx="4664353" cy="4532187"/>
+        </p:xfrm>
+        <a:graphic>
+          <a:graphicData uri="http://schemas.openxmlformats.org/presentationml/2006/ole">
+            <mc:AlternateContent xmlns:mc="http://schemas.openxmlformats.org/markup-compatibility/2006">
+              <mc:Choice xmlns:v="urn:schemas-microsoft-com:vml" Requires="v">
+                <p:oleObj spid="_x0000_s5141" name="Visio" r:id="rId4" imgW="5378350" imgH="5225935" progId="Visio.Drawing.15">
+                  <p:embed/>
+                </p:oleObj>
+              </mc:Choice>
+              <mc:Fallback>
+                <p:oleObj name="Visio" r:id="rId4" imgW="5378350" imgH="5225935" progId="Visio.Drawing.15">
+                  <p:embed/>
+                  <p:pic>
+                    <p:nvPicPr>
+                      <p:cNvPr id="0" name="Object 3"/>
+                      <p:cNvPicPr>
+                        <a:picLocks noChangeAspect="1" noChangeArrowheads="1"/>
+                      </p:cNvPicPr>
+                      <p:nvPr/>
+                    </p:nvPicPr>
+                    <p:blipFill>
+                      <a:blip r:embed="rId5">
+                        <a:extLst>
+                          <a:ext uri="{28A0092B-C50C-407E-A947-70E740481C1C}">
+                            <a14:useLocalDpi xmlns:a14="http://schemas.microsoft.com/office/drawing/2010/main" val="0"/>
+                          </a:ext>
+                        </a:extLst>
+                      </a:blip>
+                      <a:srcRect/>
+                      <a:stretch>
+                        <a:fillRect/>
+                      </a:stretch>
+                    </p:blipFill>
+                    <p:spPr bwMode="auto">
+                      <a:xfrm>
+                        <a:off x="2239824" y="747301"/>
+                        <a:ext cx="4664353" cy="4532187"/>
+                      </a:xfrm>
+                      <a:prstGeom prst="rect">
+                        <a:avLst/>
+                      </a:prstGeom>
+                      <a:noFill/>
+                    </p:spPr>
+                  </p:pic>
+                </p:oleObj>
+              </mc:Fallback>
+            </mc:AlternateContent>
+          </a:graphicData>
+        </a:graphic>
+      </p:graphicFrame>
+      <p:sp>
+        <p:nvSpPr>
+          <p:cNvPr id="12" name="Espace réservé du texte 3"/>
+          <p:cNvSpPr>
+            <a:spLocks noGrp="1"/>
+          </p:cNvSpPr>
+          <p:nvPr>
+            <p:ph type="body" sz="quarter" idx="4294967295"/>
           </p:nvPr>
         </p:nvSpPr>
         <p:spPr>
           <a:xfrm>
-            <a:off x="317421" y="114259"/>
-            <a:ext cx="3557405" cy="516874"/>
+            <a:off x="317420" y="114259"/>
+            <a:ext cx="5760000" cy="516874"/>
           </a:xfrm>
+          <a:prstGeom prst="rect">
+            <a:avLst/>
+          </a:prstGeom>
         </p:spPr>
         <p:txBody>
           <a:bodyPr anchor="ctr">
@@ -5250,69 +7091,112 @@
           </a:bodyPr>
           <a:lstStyle/>
           <a:p>
-            <a:r>
-              <a:rPr lang="fr-CH" sz="2400" dirty="0"/>
-              <a:t>Diagramme d’activité</a:t>
+            <a:pPr marL="0" indent="0">
+              <a:buNone/>
+            </a:pPr>
+            <a:r>
+              <a:rPr lang="fr-FR" sz="2400" dirty="0">
+                <a:solidFill>
+                  <a:prstClr val="white"/>
+                </a:solidFill>
+                <a:latin typeface="Segoe UI Black" panose="020B0A02040204020203" pitchFamily="34" charset="0"/>
+                <a:ea typeface="Segoe UI Black" panose="020B0A02040204020203" pitchFamily="34" charset="0"/>
+                <a:cs typeface="Segoe UI Black" panose="020B0A02040204020203" pitchFamily="34" charset="0"/>
+              </a:rPr>
+              <a:t>Diagramme de </a:t>
+            </a:r>
+            <a:r>
+              <a:rPr lang="fr-FR" sz="2400" dirty="0" smtClean="0">
+                <a:solidFill>
+                  <a:prstClr val="white"/>
+                </a:solidFill>
+                <a:latin typeface="Segoe UI Black" panose="020B0A02040204020203" pitchFamily="34" charset="0"/>
+                <a:ea typeface="Segoe UI Black" panose="020B0A02040204020203" pitchFamily="34" charset="0"/>
+                <a:cs typeface="Segoe UI Black" panose="020B0A02040204020203" pitchFamily="34" charset="0"/>
+              </a:rPr>
+              <a:t>séquence</a:t>
             </a:r>
             <a:endParaRPr lang="fr-FR" sz="2400" dirty="0"/>
           </a:p>
         </p:txBody>
       </p:sp>
-      <p:sp>
-        <p:nvSpPr>
-          <p:cNvPr id="14" name="Espace réservé du contenu 3"/>
-          <p:cNvSpPr>
-            <a:spLocks noGrp="1"/>
-          </p:cNvSpPr>
-          <p:nvPr>
-            <p:ph sz="half" idx="2"/>
+    </p:spTree>
+    <p:extLst>
+      <p:ext uri="{BB962C8B-B14F-4D97-AF65-F5344CB8AC3E}">
+        <p14:creationId xmlns:p14="http://schemas.microsoft.com/office/powerpoint/2010/main" val="254268587"/>
+      </p:ext>
+    </p:extLst>
+  </p:cSld>
+  <p:clrMapOvr>
+    <a:masterClrMapping/>
+  </p:clrMapOvr>
+  <p:transition spd="slow">
+    <p:push dir="u"/>
+  </p:transition>
+  <p:timing>
+    <p:tnLst>
+      <p:par>
+        <p:cTn id="1" dur="indefinite" restart="never" nodeType="tmRoot"/>
+      </p:par>
+    </p:tnLst>
+  </p:timing>
+</p:sld>
+</file>
+
+<file path=ppt/slides/slide8.xml><?xml version="1.0" encoding="utf-8"?>
+<p:sld xmlns:a="http://schemas.openxmlformats.org/drawingml/2006/main" xmlns:r="http://schemas.openxmlformats.org/officeDocument/2006/relationships" xmlns:p="http://schemas.openxmlformats.org/presentationml/2006/main">
+  <p:cSld>
+    <p:spTree>
+      <p:nvGrpSpPr>
+        <p:cNvPr id="1" name=""/>
+        <p:cNvGrpSpPr/>
+        <p:nvPr/>
+      </p:nvGrpSpPr>
+      <p:grpSpPr>
+        <a:xfrm>
+          <a:off x="0" y="0"/>
+          <a:ext cx="0" cy="0"/>
+          <a:chOff x="0" y="0"/>
+          <a:chExt cx="0" cy="0"/>
+        </a:xfrm>
+      </p:grpSpPr>
+      <p:sp>
+        <p:nvSpPr>
+          <p:cNvPr id="4" name="Espace réservé du texte 3"/>
+          <p:cNvSpPr>
+            <a:spLocks noGrp="1"/>
+          </p:cNvSpPr>
+          <p:nvPr>
+            <p:ph type="body" sz="quarter" idx="3"/>
           </p:nvPr>
         </p:nvSpPr>
         <p:spPr>
           <a:xfrm>
-            <a:off x="5136530" y="3356632"/>
-            <a:ext cx="3296822" cy="1072134"/>
+            <a:off x="4968000" y="1151334"/>
+            <a:ext cx="3813123" cy="3504327"/>
           </a:xfrm>
         </p:spPr>
         <p:txBody>
           <a:bodyPr/>
           <a:lstStyle/>
           <a:p>
-            <a:pPr>
-              <a:buFont typeface="Arial" panose="020B0604020202020204" pitchFamily="34" charset="0"/>
-              <a:buChar char="•"/>
-            </a:pPr>
-            <a:endParaRPr lang="fr-FR" sz="1800" dirty="0" smtClean="0"/>
-          </a:p>
-        </p:txBody>
-      </p:sp>
-      <p:sp>
-        <p:nvSpPr>
-          <p:cNvPr id="15" name="Espace réservé du texte 5"/>
-          <p:cNvSpPr>
-            <a:spLocks noGrp="1"/>
-          </p:cNvSpPr>
-          <p:nvPr>
-            <p:ph type="body" sz="quarter" idx="15"/>
-          </p:nvPr>
-        </p:nvSpPr>
-        <p:spPr>
-          <a:xfrm>
-            <a:off x="4569646" y="2767069"/>
-            <a:ext cx="3124904" cy="589563"/>
-          </a:xfrm>
-        </p:spPr>
-        <p:txBody>
-          <a:bodyPr/>
-          <a:lstStyle/>
-          <a:p>
+            <a:r>
+              <a:rPr lang="fr-FR" dirty="0" smtClean="0"/>
+              <a:t>Stock les scores de chaque joueurs</a:t>
+            </a:r>
+          </a:p>
+          <a:p>
+            <a:r>
+              <a:rPr lang="fr-FR" dirty="0" smtClean="0"/>
+              <a:t>Utilisation d’un fichier XML</a:t>
+            </a:r>
             <a:endParaRPr lang="fr-FR" dirty="0"/>
           </a:p>
         </p:txBody>
       </p:sp>
       <p:sp>
         <p:nvSpPr>
-          <p:cNvPr id="2" name="Rectangle 2"/>
+          <p:cNvPr id="10" name="Rectangle 4"/>
           <p:cNvSpPr>
             <a:spLocks noChangeArrowheads="1"/>
           </p:cNvSpPr>
@@ -5373,271 +7257,6 @@
           </a:p>
         </p:txBody>
       </p:sp>
-      <p:graphicFrame>
-        <p:nvGraphicFramePr>
-          <p:cNvPr id="3" name="Objet 2"/>
-          <p:cNvGraphicFramePr>
-            <a:graphicFrameLocks noChangeAspect="1"/>
-          </p:cNvGraphicFramePr>
-          <p:nvPr>
-            <p:extLst>
-              <p:ext uri="{D42A27DB-BD31-4B8C-83A1-F6EECF244321}">
-                <p14:modId xmlns:p14="http://schemas.microsoft.com/office/powerpoint/2010/main" val="31671986"/>
-              </p:ext>
-            </p:extLst>
-          </p:nvPr>
-        </p:nvGraphicFramePr>
-        <p:xfrm>
-          <a:off x="719452" y="819124"/>
-          <a:ext cx="2719444" cy="4320000"/>
-        </p:xfrm>
-        <a:graphic>
-          <a:graphicData uri="http://schemas.openxmlformats.org/presentationml/2006/ole">
-            <mc:AlternateContent xmlns:mc="http://schemas.openxmlformats.org/markup-compatibility/2006">
-              <mc:Choice xmlns:v="urn:schemas-microsoft-com:vml" Requires="v">
-                <p:oleObj spid="_x0000_s4099" name="Visio" r:id="rId3" imgW="3441501" imgH="5467558" progId="Visio.Drawing.15">
-                  <p:embed/>
-                </p:oleObj>
-              </mc:Choice>
-              <mc:Fallback>
-                <p:oleObj name="Visio" r:id="rId3" imgW="3441501" imgH="5467558" progId="Visio.Drawing.15">
-                  <p:embed/>
-                  <p:pic>
-                    <p:nvPicPr>
-                      <p:cNvPr id="0" name="Object 1"/>
-                      <p:cNvPicPr>
-                        <a:picLocks noChangeAspect="1" noChangeArrowheads="1"/>
-                      </p:cNvPicPr>
-                      <p:nvPr/>
-                    </p:nvPicPr>
-                    <p:blipFill>
-                      <a:blip r:embed="rId4">
-                        <a:extLst>
-                          <a:ext uri="{28A0092B-C50C-407E-A947-70E740481C1C}">
-                            <a14:useLocalDpi xmlns:a14="http://schemas.microsoft.com/office/drawing/2010/main" val="0"/>
-                          </a:ext>
-                        </a:extLst>
-                      </a:blip>
-                      <a:srcRect/>
-                      <a:stretch>
-                        <a:fillRect/>
-                      </a:stretch>
-                    </p:blipFill>
-                    <p:spPr bwMode="auto">
-                      <a:xfrm>
-                        <a:off x="719452" y="819124"/>
-                        <a:ext cx="2719444" cy="4320000"/>
-                      </a:xfrm>
-                      <a:prstGeom prst="rect">
-                        <a:avLst/>
-                      </a:prstGeom>
-                      <a:noFill/>
-                    </p:spPr>
-                  </p:pic>
-                </p:oleObj>
-              </mc:Fallback>
-            </mc:AlternateContent>
-          </a:graphicData>
-        </a:graphic>
-      </p:graphicFrame>
-    </p:spTree>
-    <p:extLst>
-      <p:ext uri="{BB962C8B-B14F-4D97-AF65-F5344CB8AC3E}">
-        <p14:creationId xmlns:p14="http://schemas.microsoft.com/office/powerpoint/2010/main" val="1216080250"/>
-      </p:ext>
-    </p:extLst>
-  </p:cSld>
-  <p:clrMapOvr>
-    <a:masterClrMapping/>
-  </p:clrMapOvr>
-  <p:timing>
-    <p:tnLst>
-      <p:par>
-        <p:cTn id="1" dur="indefinite" restart="never" nodeType="tmRoot"/>
-      </p:par>
-    </p:tnLst>
-  </p:timing>
-</p:sld>
-</file>
-
-<file path=ppt/slides/slide6.xml><?xml version="1.0" encoding="utf-8"?>
-<p:sld xmlns:a="http://schemas.openxmlformats.org/drawingml/2006/main" xmlns:r="http://schemas.openxmlformats.org/officeDocument/2006/relationships" xmlns:p="http://schemas.openxmlformats.org/presentationml/2006/main">
-  <p:cSld>
-    <p:spTree>
-      <p:nvGrpSpPr>
-        <p:cNvPr id="1" name=""/>
-        <p:cNvGrpSpPr/>
-        <p:nvPr/>
-      </p:nvGrpSpPr>
-      <p:grpSpPr>
-        <a:xfrm>
-          <a:off x="0" y="0"/>
-          <a:ext cx="0" cy="0"/>
-          <a:chOff x="0" y="0"/>
-          <a:chExt cx="0" cy="0"/>
-        </a:xfrm>
-      </p:grpSpPr>
-      <p:sp>
-        <p:nvSpPr>
-          <p:cNvPr id="4" name="Espace réservé du texte 3"/>
-          <p:cNvSpPr>
-            <a:spLocks noGrp="1"/>
-          </p:cNvSpPr>
-          <p:nvPr>
-            <p:ph type="body" sz="quarter" idx="3"/>
-          </p:nvPr>
-        </p:nvSpPr>
-        <p:spPr/>
-        <p:txBody>
-          <a:bodyPr/>
-          <a:lstStyle/>
-          <a:p>
-            <a:endParaRPr lang="fr-FR" dirty="0"/>
-          </a:p>
-        </p:txBody>
-      </p:sp>
-      <p:sp>
-        <p:nvSpPr>
-          <p:cNvPr id="7" name="Espace réservé du graphique 6"/>
-          <p:cNvSpPr>
-            <a:spLocks noGrp="1"/>
-          </p:cNvSpPr>
-          <p:nvPr>
-            <p:ph type="chart" sz="quarter" idx="16"/>
-          </p:nvPr>
-        </p:nvSpPr>
-        <p:spPr/>
-      </p:sp>
-      <p:sp>
-        <p:nvSpPr>
-          <p:cNvPr id="10" name="Rectangle 4"/>
-          <p:cNvSpPr>
-            <a:spLocks noChangeArrowheads="1"/>
-          </p:cNvSpPr>
-          <p:nvPr/>
-        </p:nvSpPr>
-        <p:spPr bwMode="auto">
-          <a:xfrm>
-            <a:off x="0" y="0"/>
-            <a:ext cx="9144000" cy="0"/>
-          </a:xfrm>
-          <a:prstGeom prst="rect">
-            <a:avLst/>
-          </a:prstGeom>
-          <a:noFill/>
-          <a:ln>
-            <a:noFill/>
-          </a:ln>
-          <a:effectLst/>
-          <a:extLst>
-            <a:ext uri="{909E8E84-426E-40DD-AFC4-6F175D3DCCD1}">
-              <a14:hiddenFill xmlns:a14="http://schemas.microsoft.com/office/drawing/2010/main">
-                <a:solidFill>
-                  <a:schemeClr val="accent1"/>
-                </a:solidFill>
-              </a14:hiddenFill>
-            </a:ext>
-            <a:ext uri="{91240B29-F687-4F45-9708-019B960494DF}">
-              <a14:hiddenLine xmlns:a14="http://schemas.microsoft.com/office/drawing/2010/main" w="9525">
-                <a:solidFill>
-                  <a:schemeClr val="tx1"/>
-                </a:solidFill>
-                <a:miter lim="800000"/>
-                <a:headEnd/>
-                <a:tailEnd/>
-              </a14:hiddenLine>
-            </a:ext>
-            <a:ext uri="{AF507438-7753-43E0-B8FC-AC1667EBCBE1}">
-              <a14:hiddenEffects xmlns:a14="http://schemas.microsoft.com/office/drawing/2010/main">
-                <a:effectLst>
-                  <a:outerShdw dist="35921" dir="2700000" algn="ctr" rotWithShape="0">
-                    <a:schemeClr val="bg2"/>
-                  </a:outerShdw>
-                </a:effectLst>
-              </a14:hiddenEffects>
-            </a:ext>
-          </a:extLst>
-        </p:spPr>
-        <p:txBody>
-          <a:bodyPr vert="horz" wrap="none" lIns="91440" tIns="45720" rIns="91440" bIns="45720" numCol="1" anchor="ctr" anchorCtr="0" compatLnSpc="1">
-            <a:prstTxWarp prst="textNoShape">
-              <a:avLst/>
-            </a:prstTxWarp>
-            <a:spAutoFit/>
-          </a:bodyPr>
-          <a:lstStyle/>
-          <a:p>
-            <a:endParaRPr lang="fr-CH"/>
-          </a:p>
-        </p:txBody>
-      </p:sp>
-      <p:graphicFrame>
-        <p:nvGraphicFramePr>
-          <p:cNvPr id="11" name="Objet 10"/>
-          <p:cNvGraphicFramePr>
-            <a:graphicFrameLocks noChangeAspect="1"/>
-          </p:cNvGraphicFramePr>
-          <p:nvPr>
-            <p:extLst>
-              <p:ext uri="{D42A27DB-BD31-4B8C-83A1-F6EECF244321}">
-                <p14:modId xmlns:p14="http://schemas.microsoft.com/office/powerpoint/2010/main" val="875301752"/>
-              </p:ext>
-            </p:extLst>
-          </p:nvPr>
-        </p:nvGraphicFramePr>
-        <p:xfrm>
-          <a:off x="0" y="747302"/>
-          <a:ext cx="4524398" cy="4396198"/>
-        </p:xfrm>
-        <a:graphic>
-          <a:graphicData uri="http://schemas.openxmlformats.org/presentationml/2006/ole">
-            <mc:AlternateContent xmlns:mc="http://schemas.openxmlformats.org/markup-compatibility/2006">
-              <mc:Choice xmlns:v="urn:schemas-microsoft-com:vml" Requires="v">
-                <p:oleObj spid="_x0000_s5125" name="Visio" r:id="rId3" imgW="5378350" imgH="5225935" progId="Visio.Drawing.15">
-                  <p:embed/>
-                </p:oleObj>
-              </mc:Choice>
-              <mc:Fallback>
-                <p:oleObj name="Visio" r:id="rId3" imgW="5378350" imgH="5225935" progId="Visio.Drawing.15">
-                  <p:embed/>
-                  <p:pic>
-                    <p:nvPicPr>
-                      <p:cNvPr id="0" name="Object 3"/>
-                      <p:cNvPicPr>
-                        <a:picLocks noChangeAspect="1" noChangeArrowheads="1"/>
-                      </p:cNvPicPr>
-                      <p:nvPr/>
-                    </p:nvPicPr>
-                    <p:blipFill>
-                      <a:blip r:embed="rId4">
-                        <a:extLst>
-                          <a:ext uri="{28A0092B-C50C-407E-A947-70E740481C1C}">
-                            <a14:useLocalDpi xmlns:a14="http://schemas.microsoft.com/office/drawing/2010/main" val="0"/>
-                          </a:ext>
-                        </a:extLst>
-                      </a:blip>
-                      <a:srcRect/>
-                      <a:stretch>
-                        <a:fillRect/>
-                      </a:stretch>
-                    </p:blipFill>
-                    <p:spPr bwMode="auto">
-                      <a:xfrm>
-                        <a:off x="0" y="747302"/>
-                        <a:ext cx="4524398" cy="4396198"/>
-                      </a:xfrm>
-                      <a:prstGeom prst="rect">
-                        <a:avLst/>
-                      </a:prstGeom>
-                      <a:noFill/>
-                    </p:spPr>
-                  </p:pic>
-                </p:oleObj>
-              </mc:Fallback>
-            </mc:AlternateContent>
-          </a:graphicData>
-        </a:graphic>
-      </p:graphicFrame>
       <p:sp>
         <p:nvSpPr>
           <p:cNvPr id="12" name="Espace réservé du texte 3"/>
@@ -5650,8 +7269,8 @@
         </p:nvSpPr>
         <p:spPr>
           <a:xfrm>
-            <a:off x="317421" y="114259"/>
-            <a:ext cx="4206977" cy="516874"/>
+            <a:off x="317420" y="114259"/>
+            <a:ext cx="5760000" cy="516874"/>
           </a:xfrm>
           <a:prstGeom prst="rect">
             <a:avLst/>
@@ -5666,17 +7285,6 @@
             <a:pPr marL="0" indent="0">
               <a:buNone/>
             </a:pPr>
-            <a:r>
-              <a:rPr lang="fr-FR" sz="2400" dirty="0">
-                <a:solidFill>
-                  <a:prstClr val="white"/>
-                </a:solidFill>
-                <a:latin typeface="Segoe UI Black" panose="020B0A02040204020203" pitchFamily="34" charset="0"/>
-                <a:ea typeface="Segoe UI Black" panose="020B0A02040204020203" pitchFamily="34" charset="0"/>
-                <a:cs typeface="Segoe UI Black" panose="020B0A02040204020203" pitchFamily="34" charset="0"/>
-              </a:rPr>
-              <a:t>Diagramme de </a:t>
-            </a:r>
             <a:r>
               <a:rPr lang="fr-FR" sz="2400" dirty="0" smtClean="0">
                 <a:solidFill>
@@ -5686,134 +7294,55 @@
                 <a:ea typeface="Segoe UI Black" panose="020B0A02040204020203" pitchFamily="34" charset="0"/>
                 <a:cs typeface="Segoe UI Black" panose="020B0A02040204020203" pitchFamily="34" charset="0"/>
               </a:rPr>
-              <a:t>séquence</a:t>
+              <a:t>Base de données</a:t>
             </a:r>
             <a:endParaRPr lang="fr-FR" sz="2400" dirty="0"/>
           </a:p>
         </p:txBody>
       </p:sp>
+      <p:pic>
+        <p:nvPicPr>
+          <p:cNvPr id="5" name="Image 4"/>
+          <p:cNvPicPr>
+            <a:picLocks noChangeAspect="1"/>
+          </p:cNvPicPr>
+          <p:nvPr/>
+        </p:nvPicPr>
+        <p:blipFill>
+          <a:blip r:embed="rId3">
+            <a:extLst>
+              <a:ext uri="{28A0092B-C50C-407E-A947-70E740481C1C}">
+                <a14:useLocalDpi xmlns:a14="http://schemas.microsoft.com/office/drawing/2010/main" val="0"/>
+              </a:ext>
+            </a:extLst>
+          </a:blip>
+          <a:stretch>
+            <a:fillRect/>
+          </a:stretch>
+        </p:blipFill>
+        <p:spPr>
+          <a:xfrm>
+            <a:off x="317420" y="1254813"/>
+            <a:ext cx="4320000" cy="3297367"/>
+          </a:xfrm>
+          <a:prstGeom prst="rect">
+            <a:avLst/>
+          </a:prstGeom>
+        </p:spPr>
+      </p:pic>
     </p:spTree>
     <p:extLst>
       <p:ext uri="{BB962C8B-B14F-4D97-AF65-F5344CB8AC3E}">
-        <p14:creationId xmlns:p14="http://schemas.microsoft.com/office/powerpoint/2010/main" val="254268587"/>
+        <p14:creationId xmlns:p14="http://schemas.microsoft.com/office/powerpoint/2010/main" val="411161959"/>
       </p:ext>
     </p:extLst>
   </p:cSld>
   <p:clrMapOvr>
     <a:masterClrMapping/>
   </p:clrMapOvr>
-  <p:timing>
-    <p:tnLst>
-      <p:par>
-        <p:cTn id="1" dur="indefinite" restart="never" nodeType="tmRoot"/>
-      </p:par>
-    </p:tnLst>
-  </p:timing>
-</p:sld>
-</file>
-
-<file path=ppt/slides/slide7.xml><?xml version="1.0" encoding="utf-8"?>
-<p:sld xmlns:a="http://schemas.openxmlformats.org/drawingml/2006/main" xmlns:r="http://schemas.openxmlformats.org/officeDocument/2006/relationships" xmlns:p="http://schemas.openxmlformats.org/presentationml/2006/main">
-  <p:cSld>
-    <p:spTree>
-      <p:nvGrpSpPr>
-        <p:cNvPr id="1" name=""/>
-        <p:cNvGrpSpPr/>
-        <p:nvPr/>
-      </p:nvGrpSpPr>
-      <p:grpSpPr>
-        <a:xfrm>
-          <a:off x="0" y="0"/>
-          <a:ext cx="0" cy="0"/>
-          <a:chOff x="0" y="0"/>
-          <a:chExt cx="0" cy="0"/>
-        </a:xfrm>
-      </p:grpSpPr>
-      <p:sp>
-        <p:nvSpPr>
-          <p:cNvPr id="2" name="Espace réservé du texte 1"/>
-          <p:cNvSpPr>
-            <a:spLocks noGrp="1"/>
-          </p:cNvSpPr>
-          <p:nvPr>
-            <p:ph type="body" sz="quarter" idx="13"/>
-          </p:nvPr>
-        </p:nvSpPr>
-        <p:spPr/>
-        <p:txBody>
-          <a:bodyPr/>
-          <a:lstStyle/>
-          <a:p>
-            <a:endParaRPr lang="fr-FR"/>
-          </a:p>
-        </p:txBody>
-      </p:sp>
-      <p:sp>
-        <p:nvSpPr>
-          <p:cNvPr id="3" name="Espace réservé du texte 2"/>
-          <p:cNvSpPr>
-            <a:spLocks noGrp="1"/>
-          </p:cNvSpPr>
-          <p:nvPr>
-            <p:ph type="body" sz="quarter" idx="14"/>
-          </p:nvPr>
-        </p:nvSpPr>
-        <p:spPr/>
-        <p:txBody>
-          <a:bodyPr/>
-          <a:lstStyle/>
-          <a:p>
-            <a:endParaRPr lang="fr-FR"/>
-          </a:p>
-        </p:txBody>
-      </p:sp>
-    </p:spTree>
-    <p:extLst>
-      <p:ext uri="{BB962C8B-B14F-4D97-AF65-F5344CB8AC3E}">
-        <p14:creationId xmlns:p14="http://schemas.microsoft.com/office/powerpoint/2010/main" val="1592037520"/>
-      </p:ext>
-    </p:extLst>
-  </p:cSld>
-  <p:clrMapOvr>
-    <a:masterClrMapping/>
-  </p:clrMapOvr>
-  <p:timing>
-    <p:tnLst>
-      <p:par>
-        <p:cTn id="1" dur="indefinite" restart="never" nodeType="tmRoot"/>
-      </p:par>
-    </p:tnLst>
-  </p:timing>
-</p:sld>
-</file>
-
-<file path=ppt/slides/slide8.xml><?xml version="1.0" encoding="utf-8"?>
-<p:sld xmlns:a="http://schemas.openxmlformats.org/drawingml/2006/main" xmlns:r="http://schemas.openxmlformats.org/officeDocument/2006/relationships" xmlns:p="http://schemas.openxmlformats.org/presentationml/2006/main">
-  <p:cSld>
-    <p:spTree>
-      <p:nvGrpSpPr>
-        <p:cNvPr id="1" name=""/>
-        <p:cNvGrpSpPr/>
-        <p:nvPr/>
-      </p:nvGrpSpPr>
-      <p:grpSpPr>
-        <a:xfrm>
-          <a:off x="0" y="0"/>
-          <a:ext cx="0" cy="0"/>
-          <a:chOff x="0" y="0"/>
-          <a:chExt cx="0" cy="0"/>
-        </a:xfrm>
-      </p:grpSpPr>
-    </p:spTree>
-    <p:extLst>
-      <p:ext uri="{BB962C8B-B14F-4D97-AF65-F5344CB8AC3E}">
-        <p14:creationId xmlns:p14="http://schemas.microsoft.com/office/powerpoint/2010/main" val="2639436419"/>
-      </p:ext>
-    </p:extLst>
-  </p:cSld>
-  <p:clrMapOvr>
-    <a:masterClrMapping/>
-  </p:clrMapOvr>
+  <p:transition spd="slow">
+    <p:push dir="u"/>
+  </p:transition>
   <p:timing>
     <p:tnLst>
       <p:par>
@@ -5843,102 +7372,75 @@
       </p:grpSpPr>
       <p:sp>
         <p:nvSpPr>
-          <p:cNvPr id="2" name="Espace réservé du texte 1"/>
-          <p:cNvSpPr>
-            <a:spLocks noGrp="1"/>
-          </p:cNvSpPr>
-          <p:nvPr>
-            <p:ph type="body" sz="half" idx="2"/>
-          </p:nvPr>
-        </p:nvSpPr>
-        <p:spPr/>
-        <p:txBody>
-          <a:bodyPr/>
+          <p:cNvPr id="4" name="Espace réservé du texte 3"/>
+          <p:cNvSpPr>
+            <a:spLocks noGrp="1"/>
+          </p:cNvSpPr>
+          <p:nvPr>
+            <p:ph type="body" sz="quarter" idx="13"/>
+          </p:nvPr>
+        </p:nvSpPr>
+        <p:spPr>
+          <a:xfrm>
+            <a:off x="317420" y="114259"/>
+            <a:ext cx="5760000" cy="516874"/>
+          </a:xfrm>
+        </p:spPr>
+        <p:txBody>
+          <a:bodyPr anchor="ctr">
+            <a:noAutofit/>
+          </a:bodyPr>
           <a:lstStyle/>
           <a:p>
-            <a:endParaRPr lang="fr-FR"/>
-          </a:p>
-        </p:txBody>
-      </p:sp>
-      <p:sp>
-        <p:nvSpPr>
-          <p:cNvPr id="3" name="Espace réservé du texte 2"/>
-          <p:cNvSpPr>
-            <a:spLocks noGrp="1"/>
-          </p:cNvSpPr>
-          <p:nvPr>
-            <p:ph type="body" sz="quarter" idx="14"/>
-          </p:nvPr>
-        </p:nvSpPr>
-        <p:spPr/>
-        <p:txBody>
-          <a:bodyPr/>
-          <a:lstStyle/>
-          <a:p>
-            <a:endParaRPr lang="fr-FR"/>
-          </a:p>
-        </p:txBody>
-      </p:sp>
-      <p:sp>
-        <p:nvSpPr>
-          <p:cNvPr id="4" name="Espace réservé du texte 3"/>
-          <p:cNvSpPr>
-            <a:spLocks noGrp="1"/>
-          </p:cNvSpPr>
-          <p:nvPr>
-            <p:ph type="body" sz="quarter" idx="15"/>
-          </p:nvPr>
-        </p:nvSpPr>
-        <p:spPr/>
-        <p:txBody>
-          <a:bodyPr/>
-          <a:lstStyle/>
-          <a:p>
-            <a:endParaRPr lang="fr-FR"/>
-          </a:p>
-        </p:txBody>
-      </p:sp>
-      <p:sp>
-        <p:nvSpPr>
-          <p:cNvPr id="5" name="Espace réservé du texte 4"/>
-          <p:cNvSpPr>
-            <a:spLocks noGrp="1"/>
-          </p:cNvSpPr>
-          <p:nvPr>
-            <p:ph type="body" sz="quarter" idx="17"/>
-          </p:nvPr>
-        </p:nvSpPr>
-        <p:spPr/>
-        <p:txBody>
-          <a:bodyPr/>
-          <a:lstStyle/>
-          <a:p>
-            <a:endParaRPr lang="fr-FR"/>
-          </a:p>
-        </p:txBody>
-      </p:sp>
-      <p:sp>
-        <p:nvSpPr>
-          <p:cNvPr id="6" name="Espace réservé du tableau 5"/>
-          <p:cNvSpPr>
-            <a:spLocks noGrp="1"/>
-          </p:cNvSpPr>
-          <p:nvPr>
-            <p:ph type="tbl" sz="quarter" idx="19"/>
-          </p:nvPr>
-        </p:nvSpPr>
-        <p:spPr/>
-      </p:sp>
+            <a:r>
+              <a:rPr lang="fr-FR" sz="2400" dirty="0" smtClean="0"/>
+              <a:t>Interface graphique du client</a:t>
+            </a:r>
+            <a:endParaRPr lang="fr-FR" sz="2400" dirty="0"/>
+          </a:p>
+        </p:txBody>
+      </p:sp>
+      <p:pic>
+        <p:nvPicPr>
+          <p:cNvPr id="5" name="Image 4"/>
+          <p:cNvPicPr/>
+          <p:nvPr/>
+        </p:nvPicPr>
+        <p:blipFill>
+          <a:blip r:embed="rId3">
+            <a:extLst>
+              <a:ext uri="{28A0092B-C50C-407E-A947-70E740481C1C}">
+                <a14:useLocalDpi xmlns:a14="http://schemas.microsoft.com/office/drawing/2010/main" val="0"/>
+              </a:ext>
+            </a:extLst>
+          </a:blip>
+          <a:stretch>
+            <a:fillRect/>
+          </a:stretch>
+        </p:blipFill>
+        <p:spPr>
+          <a:xfrm>
+            <a:off x="1691640" y="821690"/>
+            <a:ext cx="5760720" cy="4321810"/>
+          </a:xfrm>
+          <a:prstGeom prst="rect">
+            <a:avLst/>
+          </a:prstGeom>
+        </p:spPr>
+      </p:pic>
     </p:spTree>
     <p:extLst>
       <p:ext uri="{BB962C8B-B14F-4D97-AF65-F5344CB8AC3E}">
-        <p14:creationId xmlns:p14="http://schemas.microsoft.com/office/powerpoint/2010/main" val="2362763898"/>
+        <p14:creationId xmlns:p14="http://schemas.microsoft.com/office/powerpoint/2010/main" val="1276339525"/>
       </p:ext>
     </p:extLst>
   </p:cSld>
   <p:clrMapOvr>
     <a:masterClrMapping/>
   </p:clrMapOvr>
+  <p:transition spd="slow">
+    <p:push dir="u"/>
+  </p:transition>
   <p:timing>
     <p:tnLst>
       <p:par>
@@ -6277,6 +7779,267 @@
 <file path=ppt/theme/theme2.xml><?xml version="1.0" encoding="utf-8"?>
 <a:theme xmlns:a="http://schemas.openxmlformats.org/drawingml/2006/main" name="Thème Office">
   <a:themeElements>
+    <a:clrScheme name="Office">
+      <a:dk1>
+        <a:sysClr val="windowText" lastClr="000000"/>
+      </a:dk1>
+      <a:lt1>
+        <a:sysClr val="window" lastClr="FFFFFF"/>
+      </a:lt1>
+      <a:dk2>
+        <a:srgbClr val="44546A"/>
+      </a:dk2>
+      <a:lt2>
+        <a:srgbClr val="E7E6E6"/>
+      </a:lt2>
+      <a:accent1>
+        <a:srgbClr val="5B9BD5"/>
+      </a:accent1>
+      <a:accent2>
+        <a:srgbClr val="ED7D31"/>
+      </a:accent2>
+      <a:accent3>
+        <a:srgbClr val="A5A5A5"/>
+      </a:accent3>
+      <a:accent4>
+        <a:srgbClr val="FFC000"/>
+      </a:accent4>
+      <a:accent5>
+        <a:srgbClr val="4472C4"/>
+      </a:accent5>
+      <a:accent6>
+        <a:srgbClr val="70AD47"/>
+      </a:accent6>
+      <a:hlink>
+        <a:srgbClr val="0563C1"/>
+      </a:hlink>
+      <a:folHlink>
+        <a:srgbClr val="954F72"/>
+      </a:folHlink>
+    </a:clrScheme>
+    <a:fontScheme name="Office">
+      <a:majorFont>
+        <a:latin typeface="Calibri Light" panose="020F0302020204030204"/>
+        <a:ea typeface=""/>
+        <a:cs typeface=""/>
+        <a:font script="Jpan" typeface="ＭＳ Ｐゴシック"/>
+        <a:font script="Hang" typeface="맑은 고딕"/>
+        <a:font script="Hans" typeface="宋体"/>
+        <a:font script="Hant" typeface="新細明體"/>
+        <a:font script="Arab" typeface="Times New Roman"/>
+        <a:font script="Hebr" typeface="Times New Roman"/>
+        <a:font script="Thai" typeface="Angsana New"/>
+        <a:font script="Ethi" typeface="Nyala"/>
+        <a:font script="Beng" typeface="Vrinda"/>
+        <a:font script="Gujr" typeface="Shruti"/>
+        <a:font script="Khmr" typeface="MoolBoran"/>
+        <a:font script="Knda" typeface="Tunga"/>
+        <a:font script="Guru" typeface="Raavi"/>
+        <a:font script="Cans" typeface="Euphemia"/>
+        <a:font script="Cher" typeface="Plantagenet Cherokee"/>
+        <a:font script="Yiii" typeface="Microsoft Yi Baiti"/>
+        <a:font script="Tibt" typeface="Microsoft Himalaya"/>
+        <a:font script="Thaa" typeface="MV Boli"/>
+        <a:font script="Deva" typeface="Mangal"/>
+        <a:font script="Telu" typeface="Gautami"/>
+        <a:font script="Taml" typeface="Latha"/>
+        <a:font script="Syrc" typeface="Estrangelo Edessa"/>
+        <a:font script="Orya" typeface="Kalinga"/>
+        <a:font script="Mlym" typeface="Kartika"/>
+        <a:font script="Laoo" typeface="DokChampa"/>
+        <a:font script="Sinh" typeface="Iskoola Pota"/>
+        <a:font script="Mong" typeface="Mongolian Baiti"/>
+        <a:font script="Viet" typeface="Times New Roman"/>
+        <a:font script="Uigh" typeface="Microsoft Uighur"/>
+        <a:font script="Geor" typeface="Sylfaen"/>
+      </a:majorFont>
+      <a:minorFont>
+        <a:latin typeface="Calibri" panose="020F0502020204030204"/>
+        <a:ea typeface=""/>
+        <a:cs typeface=""/>
+        <a:font script="Jpan" typeface="ＭＳ Ｐゴシック"/>
+        <a:font script="Hang" typeface="맑은 고딕"/>
+        <a:font script="Hans" typeface="宋体"/>
+        <a:font script="Hant" typeface="新細明體"/>
+        <a:font script="Arab" typeface="Arial"/>
+        <a:font script="Hebr" typeface="Arial"/>
+        <a:font script="Thai" typeface="Cordia New"/>
+        <a:font script="Ethi" typeface="Nyala"/>
+        <a:font script="Beng" typeface="Vrinda"/>
+        <a:font script="Gujr" typeface="Shruti"/>
+        <a:font script="Khmr" typeface="DaunPenh"/>
+        <a:font script="Knda" typeface="Tunga"/>
+        <a:font script="Guru" typeface="Raavi"/>
+        <a:font script="Cans" typeface="Euphemia"/>
+        <a:font script="Cher" typeface="Plantagenet Cherokee"/>
+        <a:font script="Yiii" typeface="Microsoft Yi Baiti"/>
+        <a:font script="Tibt" typeface="Microsoft Himalaya"/>
+        <a:font script="Thaa" typeface="MV Boli"/>
+        <a:font script="Deva" typeface="Mangal"/>
+        <a:font script="Telu" typeface="Gautami"/>
+        <a:font script="Taml" typeface="Latha"/>
+        <a:font script="Syrc" typeface="Estrangelo Edessa"/>
+        <a:font script="Orya" typeface="Kalinga"/>
+        <a:font script="Mlym" typeface="Kartika"/>
+        <a:font script="Laoo" typeface="DokChampa"/>
+        <a:font script="Sinh" typeface="Iskoola Pota"/>
+        <a:font script="Mong" typeface="Mongolian Baiti"/>
+        <a:font script="Viet" typeface="Arial"/>
+        <a:font script="Uigh" typeface="Microsoft Uighur"/>
+        <a:font script="Geor" typeface="Sylfaen"/>
+      </a:minorFont>
+    </a:fontScheme>
+    <a:fmtScheme name="Office">
+      <a:fillStyleLst>
+        <a:solidFill>
+          <a:schemeClr val="phClr"/>
+        </a:solidFill>
+        <a:gradFill rotWithShape="1">
+          <a:gsLst>
+            <a:gs pos="0">
+              <a:schemeClr val="phClr">
+                <a:lumMod val="110000"/>
+                <a:satMod val="105000"/>
+                <a:tint val="67000"/>
+              </a:schemeClr>
+            </a:gs>
+            <a:gs pos="50000">
+              <a:schemeClr val="phClr">
+                <a:lumMod val="105000"/>
+                <a:satMod val="103000"/>
+                <a:tint val="73000"/>
+              </a:schemeClr>
+            </a:gs>
+            <a:gs pos="100000">
+              <a:schemeClr val="phClr">
+                <a:lumMod val="105000"/>
+                <a:satMod val="109000"/>
+                <a:tint val="81000"/>
+              </a:schemeClr>
+            </a:gs>
+          </a:gsLst>
+          <a:lin ang="5400000" scaled="0"/>
+        </a:gradFill>
+        <a:gradFill rotWithShape="1">
+          <a:gsLst>
+            <a:gs pos="0">
+              <a:schemeClr val="phClr">
+                <a:satMod val="103000"/>
+                <a:lumMod val="102000"/>
+                <a:tint val="94000"/>
+              </a:schemeClr>
+            </a:gs>
+            <a:gs pos="50000">
+              <a:schemeClr val="phClr">
+                <a:satMod val="110000"/>
+                <a:lumMod val="100000"/>
+                <a:shade val="100000"/>
+              </a:schemeClr>
+            </a:gs>
+            <a:gs pos="100000">
+              <a:schemeClr val="phClr">
+                <a:lumMod val="99000"/>
+                <a:satMod val="120000"/>
+                <a:shade val="78000"/>
+              </a:schemeClr>
+            </a:gs>
+          </a:gsLst>
+          <a:lin ang="5400000" scaled="0"/>
+        </a:gradFill>
+      </a:fillStyleLst>
+      <a:lnStyleLst>
+        <a:ln w="6350" cap="flat" cmpd="sng" algn="ctr">
+          <a:solidFill>
+            <a:schemeClr val="phClr"/>
+          </a:solidFill>
+          <a:prstDash val="solid"/>
+          <a:miter lim="800000"/>
+        </a:ln>
+        <a:ln w="12700" cap="flat" cmpd="sng" algn="ctr">
+          <a:solidFill>
+            <a:schemeClr val="phClr"/>
+          </a:solidFill>
+          <a:prstDash val="solid"/>
+          <a:miter lim="800000"/>
+        </a:ln>
+        <a:ln w="19050" cap="flat" cmpd="sng" algn="ctr">
+          <a:solidFill>
+            <a:schemeClr val="phClr"/>
+          </a:solidFill>
+          <a:prstDash val="solid"/>
+          <a:miter lim="800000"/>
+        </a:ln>
+      </a:lnStyleLst>
+      <a:effectStyleLst>
+        <a:effectStyle>
+          <a:effectLst/>
+        </a:effectStyle>
+        <a:effectStyle>
+          <a:effectLst/>
+        </a:effectStyle>
+        <a:effectStyle>
+          <a:effectLst>
+            <a:outerShdw blurRad="57150" dist="19050" dir="5400000" algn="ctr" rotWithShape="0">
+              <a:srgbClr val="000000">
+                <a:alpha val="63000"/>
+              </a:srgbClr>
+            </a:outerShdw>
+          </a:effectLst>
+        </a:effectStyle>
+      </a:effectStyleLst>
+      <a:bgFillStyleLst>
+        <a:solidFill>
+          <a:schemeClr val="phClr"/>
+        </a:solidFill>
+        <a:solidFill>
+          <a:schemeClr val="phClr">
+            <a:tint val="95000"/>
+            <a:satMod val="170000"/>
+          </a:schemeClr>
+        </a:solidFill>
+        <a:gradFill rotWithShape="1">
+          <a:gsLst>
+            <a:gs pos="0">
+              <a:schemeClr val="phClr">
+                <a:tint val="93000"/>
+                <a:satMod val="150000"/>
+                <a:shade val="98000"/>
+                <a:lumMod val="102000"/>
+              </a:schemeClr>
+            </a:gs>
+            <a:gs pos="50000">
+              <a:schemeClr val="phClr">
+                <a:tint val="98000"/>
+                <a:satMod val="130000"/>
+                <a:shade val="90000"/>
+                <a:lumMod val="103000"/>
+              </a:schemeClr>
+            </a:gs>
+            <a:gs pos="100000">
+              <a:schemeClr val="phClr">
+                <a:shade val="63000"/>
+                <a:satMod val="120000"/>
+              </a:schemeClr>
+            </a:gs>
+          </a:gsLst>
+          <a:lin ang="5400000" scaled="0"/>
+        </a:gradFill>
+      </a:bgFillStyleLst>
+    </a:fmtScheme>
+  </a:themeElements>
+  <a:objectDefaults/>
+  <a:extraClrSchemeLst/>
+  <a:extLst>
+    <a:ext uri="{05A4C25C-085E-4340-85A3-A5531E510DB2}">
+      <thm15:themeFamily xmlns:thm15="http://schemas.microsoft.com/office/thememl/2012/main" name="Office Theme" id="{62F939B6-93AF-4DB8-9C6B-D6C7DFDC589F}" vid="{4A3C46E8-61CC-4603-A589-7422A47A8E4A}"/>
+    </a:ext>
+  </a:extLst>
+</a:theme>
+</file>
+
+<file path=ppt/theme/theme3.xml><?xml version="1.0" encoding="utf-8"?>
+<a:theme xmlns:a="http://schemas.openxmlformats.org/drawingml/2006/main" name="Thème Office">
+  <a:themeElements>
     <a:clrScheme name="Bureau">
       <a:dk1>
         <a:sysClr val="windowText" lastClr="000000"/>

</xml_diff>